<commit_message>
Add slide for example commands ill talk about
</commit_message>
<xml_diff>
--- a/CS590VC_Sqoop_Presentation.pptx
+++ b/CS590VC_Sqoop_Presentation.pptx
@@ -11,16 +11,17 @@
     <p:sldId id="259" r:id="rId5"/>
     <p:sldId id="260" r:id="rId6"/>
     <p:sldId id="261" r:id="rId7"/>
-    <p:sldId id="258" r:id="rId8"/>
-    <p:sldId id="267" r:id="rId9"/>
-    <p:sldId id="268" r:id="rId10"/>
-    <p:sldId id="269" r:id="rId11"/>
-    <p:sldId id="262" r:id="rId12"/>
-    <p:sldId id="263" r:id="rId13"/>
-    <p:sldId id="264" r:id="rId14"/>
-    <p:sldId id="265" r:id="rId15"/>
-    <p:sldId id="266" r:id="rId16"/>
-    <p:sldId id="270" r:id="rId17"/>
+    <p:sldId id="272" r:id="rId8"/>
+    <p:sldId id="258" r:id="rId9"/>
+    <p:sldId id="267" r:id="rId10"/>
+    <p:sldId id="268" r:id="rId11"/>
+    <p:sldId id="269" r:id="rId12"/>
+    <p:sldId id="262" r:id="rId13"/>
+    <p:sldId id="263" r:id="rId14"/>
+    <p:sldId id="264" r:id="rId15"/>
+    <p:sldId id="265" r:id="rId16"/>
+    <p:sldId id="266" r:id="rId17"/>
+    <p:sldId id="270" r:id="rId18"/>
   </p:sldIdLst>
   <p:sldSz cx="9144000" cy="6858000" type="screen4x3"/>
   <p:notesSz cx="6858000" cy="9144000"/>
@@ -2923,7 +2924,7 @@
           <a:p>
             <a:fld id="{D0F077DA-F4F8-4FBF-8857-A982F42B951C}" type="datetimeFigureOut">
               <a:rPr lang="en-US" smtClean="0"/>
-              <a:t>10/27/2013</a:t>
+              <a:t>11/4/2013</a:t>
             </a:fld>
             <a:endParaRPr lang="en-US"/>
           </a:p>
@@ -3436,7 +3437,7 @@
           <a:p>
             <a:fld id="{D0F077DA-F4F8-4FBF-8857-A982F42B951C}" type="datetimeFigureOut">
               <a:rPr lang="en-US" smtClean="0"/>
-              <a:t>10/27/2013</a:t>
+              <a:t>11/4/2013</a:t>
             </a:fld>
             <a:endParaRPr lang="en-US"/>
           </a:p>
@@ -3611,7 +3612,7 @@
           <a:p>
             <a:fld id="{D0F077DA-F4F8-4FBF-8857-A982F42B951C}" type="datetimeFigureOut">
               <a:rPr lang="en-US" smtClean="0"/>
-              <a:t>10/27/2013</a:t>
+              <a:t>11/4/2013</a:t>
             </a:fld>
             <a:endParaRPr lang="en-US"/>
           </a:p>
@@ -3776,7 +3777,7 @@
           <a:p>
             <a:fld id="{D0F077DA-F4F8-4FBF-8857-A982F42B951C}" type="datetimeFigureOut">
               <a:rPr lang="en-US" smtClean="0"/>
-              <a:t>10/27/2013</a:t>
+              <a:t>11/4/2013</a:t>
             </a:fld>
             <a:endParaRPr lang="en-US"/>
           </a:p>
@@ -6900,7 +6901,7 @@
           <a:p>
             <a:fld id="{D0F077DA-F4F8-4FBF-8857-A982F42B951C}" type="datetimeFigureOut">
               <a:rPr lang="en-US" smtClean="0"/>
-              <a:t>10/27/2013</a:t>
+              <a:t>11/4/2013</a:t>
             </a:fld>
             <a:endParaRPr lang="en-US"/>
           </a:p>
@@ -7183,7 +7184,7 @@
           <a:p>
             <a:fld id="{D0F077DA-F4F8-4FBF-8857-A982F42B951C}" type="datetimeFigureOut">
               <a:rPr lang="en-US" smtClean="0"/>
-              <a:t>10/27/2013</a:t>
+              <a:t>11/4/2013</a:t>
             </a:fld>
             <a:endParaRPr lang="en-US"/>
           </a:p>
@@ -7600,7 +7601,7 @@
           <a:p>
             <a:fld id="{D0F077DA-F4F8-4FBF-8857-A982F42B951C}" type="datetimeFigureOut">
               <a:rPr lang="en-US" smtClean="0"/>
-              <a:t>10/27/2013</a:t>
+              <a:t>11/4/2013</a:t>
             </a:fld>
             <a:endParaRPr lang="en-US"/>
           </a:p>
@@ -7713,7 +7714,7 @@
           <a:p>
             <a:fld id="{D0F077DA-F4F8-4FBF-8857-A982F42B951C}" type="datetimeFigureOut">
               <a:rPr lang="en-US" smtClean="0"/>
-              <a:t>10/27/2013</a:t>
+              <a:t>11/4/2013</a:t>
             </a:fld>
             <a:endParaRPr lang="en-US"/>
           </a:p>
@@ -7803,7 +7804,7 @@
           <a:p>
             <a:fld id="{D0F077DA-F4F8-4FBF-8857-A982F42B951C}" type="datetimeFigureOut">
               <a:rPr lang="en-US" smtClean="0"/>
-              <a:t>10/27/2013</a:t>
+              <a:t>11/4/2013</a:t>
             </a:fld>
             <a:endParaRPr lang="en-US"/>
           </a:p>
@@ -7978,7 +7979,7 @@
           <a:p>
             <a:fld id="{D0F077DA-F4F8-4FBF-8857-A982F42B951C}" type="datetimeFigureOut">
               <a:rPr lang="en-US" smtClean="0"/>
-              <a:t>10/27/2013</a:t>
+              <a:t>11/4/2013</a:t>
             </a:fld>
             <a:endParaRPr lang="en-US"/>
           </a:p>
@@ -8464,7 +8465,7 @@
           <a:p>
             <a:fld id="{D0F077DA-F4F8-4FBF-8857-A982F42B951C}" type="datetimeFigureOut">
               <a:rPr lang="en-US" smtClean="0"/>
-              <a:t>10/27/2013</a:t>
+              <a:t>11/4/2013</a:t>
             </a:fld>
             <a:endParaRPr lang="en-US"/>
           </a:p>
@@ -9016,7 +9017,7 @@
           <a:p>
             <a:fld id="{D0F077DA-F4F8-4FBF-8857-A982F42B951C}" type="datetimeFigureOut">
               <a:rPr lang="en-US" smtClean="0"/>
-              <a:t>10/27/2013</a:t>
+              <a:t>11/4/2013</a:t>
             </a:fld>
             <a:endParaRPr lang="en-US"/>
           </a:p>
@@ -9489,11 +9490,11 @@
   <p:clrMapOvr>
     <a:masterClrMapping/>
   </p:clrMapOvr>
-  <mc:AlternateContent xmlns:mc="http://schemas.openxmlformats.org/markup-compatibility/2006">
-    <mc:Choice xmlns:p14="http://schemas.microsoft.com/office/powerpoint/2010/main" Requires="p14">
+  <mc:AlternateContent xmlns:mc="http://schemas.openxmlformats.org/markup-compatibility/2006" xmlns:p14="http://schemas.microsoft.com/office/powerpoint/2010/main">
+    <mc:Choice Requires="p14">
       <p:transition spd="slow" p14:dur="2000"/>
     </mc:Choice>
-    <mc:Fallback>
+    <mc:Fallback xmlns="">
       <p:transition spd="slow"/>
     </mc:Fallback>
   </mc:AlternateContent>
@@ -9542,7 +9543,7 @@
             <a:pPr algn="ctr"/>
             <a:r>
               <a:rPr lang="en-US" dirty="0" smtClean="0"/>
-              <a:t>Export Process</a:t>
+              <a:t>Export Architecture Diagram</a:t>
             </a:r>
             <a:endParaRPr lang="en-US" dirty="0"/>
           </a:p>
@@ -9563,157 +9564,78 @@
           <a:bodyPr/>
           <a:lstStyle/>
           <a:p>
-            <a:pPr marL="457200" indent="-457200">
-              <a:buFont typeface="+mj-lt"/>
-              <a:buAutoNum type="arabicPeriod"/>
-            </a:pPr>
-            <a:r>
-              <a:rPr lang="en-US" dirty="0" smtClean="0"/>
-              <a:t>Validates metadata before exporting it into RDBMS</a:t>
-            </a:r>
-          </a:p>
-          <a:p>
-            <a:pPr marL="457200" indent="-457200">
-              <a:buFont typeface="+mj-lt"/>
-              <a:buAutoNum type="arabicPeriod"/>
-            </a:pPr>
-            <a:r>
-              <a:rPr lang="en-US" dirty="0" smtClean="0"/>
-              <a:t>Executes </a:t>
-            </a:r>
-            <a:r>
-              <a:rPr lang="en-US" dirty="0" err="1" smtClean="0"/>
-              <a:t>MapReduce</a:t>
-            </a:r>
-            <a:r>
-              <a:rPr lang="en-US" dirty="0" smtClean="0"/>
-              <a:t> job to transport data</a:t>
-            </a:r>
-          </a:p>
-          <a:p>
-            <a:r>
-              <a:rPr lang="en-US" dirty="0" smtClean="0"/>
-              <a:t>Example</a:t>
-            </a:r>
-          </a:p>
-          <a:p>
-            <a:pPr lvl="1"/>
-            <a:r>
-              <a:rPr lang="en-US" dirty="0" err="1">
-                <a:latin typeface="Courier New" pitchFamily="49" charset="0"/>
-                <a:cs typeface="Courier New" pitchFamily="49" charset="0"/>
-              </a:rPr>
-              <a:t>s</a:t>
-            </a:r>
-            <a:r>
-              <a:rPr lang="en-US" dirty="0" err="1" smtClean="0">
-                <a:latin typeface="Courier New" pitchFamily="49" charset="0"/>
-                <a:cs typeface="Courier New" pitchFamily="49" charset="0"/>
-              </a:rPr>
-              <a:t>qoop</a:t>
-            </a:r>
-            <a:r>
-              <a:rPr lang="en-US" dirty="0" smtClean="0">
-                <a:latin typeface="Courier New" pitchFamily="49" charset="0"/>
-                <a:cs typeface="Courier New" pitchFamily="49" charset="0"/>
-              </a:rPr>
-              <a:t> export –connect </a:t>
-            </a:r>
-            <a:r>
-              <a:rPr lang="en-US" dirty="0" err="1" smtClean="0">
-                <a:latin typeface="Courier New" pitchFamily="49" charset="0"/>
-                <a:cs typeface="Courier New" pitchFamily="49" charset="0"/>
-              </a:rPr>
-              <a:t>jdbc:mysql</a:t>
-            </a:r>
-            <a:r>
-              <a:rPr lang="en-US" dirty="0" smtClean="0">
-                <a:latin typeface="Courier New" pitchFamily="49" charset="0"/>
-                <a:cs typeface="Courier New" pitchFamily="49" charset="0"/>
-              </a:rPr>
-              <a:t>://localhost:8088/</a:t>
-            </a:r>
-            <a:r>
-              <a:rPr lang="en-US" dirty="0" err="1" smtClean="0">
-                <a:latin typeface="Courier New" pitchFamily="49" charset="0"/>
-                <a:cs typeface="Courier New" pitchFamily="49" charset="0"/>
-              </a:rPr>
-              <a:t>db</a:t>
-            </a:r>
-            <a:r>
-              <a:rPr lang="en-US" dirty="0" smtClean="0">
-                <a:latin typeface="Courier New" pitchFamily="49" charset="0"/>
-                <a:cs typeface="Courier New" pitchFamily="49" charset="0"/>
-              </a:rPr>
-              <a:t> --table </a:t>
-            </a:r>
-            <a:r>
-              <a:rPr lang="en-US" dirty="0" err="1" smtClean="0">
-                <a:latin typeface="Courier New" pitchFamily="49" charset="0"/>
-                <a:cs typeface="Courier New" pitchFamily="49" charset="0"/>
-              </a:rPr>
-              <a:t>tableName</a:t>
-            </a:r>
-            <a:r>
-              <a:rPr lang="en-US" dirty="0" smtClean="0">
-                <a:latin typeface="Courier New" pitchFamily="49" charset="0"/>
-                <a:cs typeface="Courier New" pitchFamily="49" charset="0"/>
-              </a:rPr>
-              <a:t> --username root --password pass –export-</a:t>
-            </a:r>
-            <a:r>
-              <a:rPr lang="en-US" dirty="0" err="1" smtClean="0">
-                <a:latin typeface="Courier New" pitchFamily="49" charset="0"/>
-                <a:cs typeface="Courier New" pitchFamily="49" charset="0"/>
-              </a:rPr>
-              <a:t>dir</a:t>
-            </a:r>
-            <a:r>
-              <a:rPr lang="en-US" dirty="0" smtClean="0">
-                <a:latin typeface="Courier New" pitchFamily="49" charset="0"/>
-                <a:cs typeface="Courier New" pitchFamily="49" charset="0"/>
-              </a:rPr>
-              <a:t> /</a:t>
-            </a:r>
-            <a:r>
-              <a:rPr lang="en-US" dirty="0" err="1" smtClean="0">
-                <a:latin typeface="Courier New" pitchFamily="49" charset="0"/>
-                <a:cs typeface="Courier New" pitchFamily="49" charset="0"/>
-              </a:rPr>
-              <a:t>usr</a:t>
-            </a:r>
-            <a:r>
-              <a:rPr lang="en-US" dirty="0" smtClean="0">
-                <a:latin typeface="Courier New" pitchFamily="49" charset="0"/>
-                <a:cs typeface="Courier New" pitchFamily="49" charset="0"/>
-              </a:rPr>
-              <a:t>/local/</a:t>
-            </a:r>
-            <a:r>
-              <a:rPr lang="en-US" dirty="0" err="1" smtClean="0">
-                <a:latin typeface="Courier New" pitchFamily="49" charset="0"/>
-                <a:cs typeface="Courier New" pitchFamily="49" charset="0"/>
-              </a:rPr>
-              <a:t>tableName</a:t>
-            </a:r>
-            <a:r>
-              <a:rPr lang="en-US" dirty="0" smtClean="0">
-                <a:latin typeface="Courier New" pitchFamily="49" charset="0"/>
-                <a:cs typeface="Courier New" pitchFamily="49" charset="0"/>
-              </a:rPr>
-              <a:t>  </a:t>
-            </a:r>
-            <a:endParaRPr lang="en-US" dirty="0">
-              <a:latin typeface="Courier New" pitchFamily="49" charset="0"/>
-              <a:cs typeface="Courier New" pitchFamily="49" charset="0"/>
-            </a:endParaRPr>
+            <a:endParaRPr lang="en-US" dirty="0"/>
           </a:p>
         </p:txBody>
       </p:sp>
+      <p:pic>
+        <p:nvPicPr>
+          <p:cNvPr id="2050" name="Picture 2"/>
+          <p:cNvPicPr>
+            <a:picLocks noChangeAspect="1" noChangeArrowheads="1"/>
+          </p:cNvPicPr>
+          <p:nvPr/>
+        </p:nvPicPr>
+        <p:blipFill>
+          <a:blip r:embed="rId2">
+            <a:extLst>
+              <a:ext uri="{28A0092B-C50C-407E-A947-70E740481C1C}">
+                <a14:useLocalDpi xmlns:a14="http://schemas.microsoft.com/office/drawing/2010/main" val="0"/>
+              </a:ext>
+            </a:extLst>
+          </a:blip>
+          <a:srcRect/>
+          <a:stretch>
+            <a:fillRect/>
+          </a:stretch>
+        </p:blipFill>
+        <p:spPr bwMode="auto">
+          <a:xfrm>
+            <a:off x="533400" y="1620369"/>
+            <a:ext cx="7950740" cy="4628031"/>
+          </a:xfrm>
+          <a:prstGeom prst="rect">
+            <a:avLst/>
+          </a:prstGeom>
+          <a:noFill/>
+          <a:ln>
+            <a:noFill/>
+          </a:ln>
+          <a:effectLst/>
+          <a:extLst>
+            <a:ext uri="{909E8E84-426E-40DD-AFC4-6F175D3DCCD1}">
+              <a14:hiddenFill xmlns:a14="http://schemas.microsoft.com/office/drawing/2010/main">
+                <a:solidFill>
+                  <a:schemeClr val="accent1"/>
+                </a:solidFill>
+              </a14:hiddenFill>
+            </a:ext>
+            <a:ext uri="{91240B29-F687-4F45-9708-019B960494DF}">
+              <a14:hiddenLine xmlns:a14="http://schemas.microsoft.com/office/drawing/2010/main" w="9525">
+                <a:solidFill>
+                  <a:schemeClr val="tx1"/>
+                </a:solidFill>
+                <a:miter lim="800000"/>
+                <a:headEnd/>
+                <a:tailEnd/>
+              </a14:hiddenLine>
+            </a:ext>
+            <a:ext uri="{AF507438-7753-43E0-B8FC-AC1667EBCBE1}">
+              <a14:hiddenEffects xmlns:a14="http://schemas.microsoft.com/office/drawing/2010/main">
+                <a:effectLst>
+                  <a:outerShdw dist="35921" dir="2700000" algn="ctr" rotWithShape="0">
+                    <a:schemeClr val="bg2"/>
+                  </a:outerShdw>
+                </a:effectLst>
+              </a14:hiddenEffects>
+            </a:ext>
+          </a:extLst>
+        </p:spPr>
+      </p:pic>
     </p:spTree>
     <p:extLst>
       <p:ext uri="{BB962C8B-B14F-4D97-AF65-F5344CB8AC3E}">
-        <p14:creationId xmlns:p14="http://schemas.microsoft.com/office/powerpoint/2010/main" val="1939304956"/>
+        <p14:creationId xmlns:p14="http://schemas.microsoft.com/office/powerpoint/2010/main" val="1338451944"/>
       </p:ext>
     </p:extLst>
   </p:cSld>
@@ -9765,7 +9687,7 @@
             <a:pPr algn="ctr"/>
             <a:r>
               <a:rPr lang="en-US" dirty="0" smtClean="0"/>
-              <a:t>Demo</a:t>
+              <a:t>Export Process</a:t>
             </a:r>
             <a:endParaRPr lang="en-US" dirty="0"/>
           </a:p>
@@ -9786,148 +9708,157 @@
           <a:bodyPr/>
           <a:lstStyle/>
           <a:p>
+            <a:pPr marL="457200" indent="-457200">
+              <a:buFont typeface="+mj-lt"/>
+              <a:buAutoNum type="arabicPeriod"/>
+            </a:pPr>
             <a:r>
               <a:rPr lang="en-US" dirty="0" smtClean="0"/>
-              <a:t>Setup</a:t>
+              <a:t>Validates metadata before exporting it into RDBMS</a:t>
+            </a:r>
+          </a:p>
+          <a:p>
+            <a:pPr marL="457200" indent="-457200">
+              <a:buFont typeface="+mj-lt"/>
+              <a:buAutoNum type="arabicPeriod"/>
+            </a:pPr>
+            <a:r>
+              <a:rPr lang="en-US" dirty="0" smtClean="0"/>
+              <a:t>Executes </a:t>
+            </a:r>
+            <a:r>
+              <a:rPr lang="en-US" dirty="0" err="1" smtClean="0"/>
+              <a:t>MapReduce</a:t>
+            </a:r>
+            <a:r>
+              <a:rPr lang="en-US" dirty="0" smtClean="0"/>
+              <a:t> job to transport data</a:t>
+            </a:r>
+          </a:p>
+          <a:p>
+            <a:r>
+              <a:rPr lang="en-US" dirty="0" smtClean="0"/>
+              <a:t>Example</a:t>
             </a:r>
           </a:p>
           <a:p>
             <a:pPr lvl="1"/>
             <a:r>
-              <a:rPr lang="en-US" dirty="0" smtClean="0"/>
-              <a:t>Install </a:t>
-            </a:r>
-            <a:r>
-              <a:rPr lang="en-US" dirty="0" err="1" smtClean="0"/>
-              <a:t>Hadoop</a:t>
-            </a:r>
-            <a:r>
-              <a:rPr lang="en-US" dirty="0" smtClean="0"/>
-              <a:t>, </a:t>
-            </a:r>
-            <a:r>
-              <a:rPr lang="en-US" dirty="0" err="1" smtClean="0"/>
-              <a:t>Hbase</a:t>
-            </a:r>
-            <a:r>
-              <a:rPr lang="en-US" dirty="0" smtClean="0"/>
-              <a:t>, Hive, </a:t>
-            </a:r>
-            <a:r>
-              <a:rPr lang="en-US" dirty="0" err="1" smtClean="0"/>
-              <a:t>Sqoop</a:t>
-            </a:r>
-            <a:endParaRPr lang="en-US" dirty="0" smtClean="0"/>
-          </a:p>
-          <a:p>
-            <a:pPr lvl="1"/>
-            <a:r>
-              <a:rPr lang="en-US" dirty="0" smtClean="0"/>
-              <a:t>Apache </a:t>
-            </a:r>
-            <a:r>
-              <a:rPr lang="en-US" dirty="0" err="1" smtClean="0"/>
-              <a:t>BigTop</a:t>
-            </a:r>
-            <a:r>
-              <a:rPr lang="en-US" dirty="0" smtClean="0"/>
-              <a:t> 0.50</a:t>
-            </a:r>
-          </a:p>
-          <a:p>
-            <a:pPr lvl="2"/>
-            <a:r>
-              <a:rPr lang="en-US" dirty="0" smtClean="0"/>
-              <a:t>bigtop.apache.org</a:t>
-            </a:r>
-          </a:p>
-          <a:p>
-            <a:pPr lvl="2"/>
-            <a:r>
-              <a:rPr lang="en-US" dirty="0" smtClean="0"/>
-              <a:t>Packaging and interoperability between </a:t>
-            </a:r>
-            <a:r>
-              <a:rPr lang="en-US" dirty="0" err="1" smtClean="0"/>
-              <a:t>Hadoop</a:t>
-            </a:r>
-            <a:r>
-              <a:rPr lang="en-US" dirty="0" smtClean="0"/>
-              <a:t> related projects.</a:t>
-            </a:r>
-          </a:p>
-          <a:p>
-            <a:pPr lvl="1"/>
-            <a:r>
-              <a:rPr lang="en-US" dirty="0" smtClean="0"/>
-              <a:t>Install MySQL</a:t>
-            </a:r>
-          </a:p>
-          <a:p>
-            <a:pPr lvl="2"/>
-            <a:r>
-              <a:rPr lang="en-US" dirty="0" smtClean="0"/>
-              <a:t>Open source RDBMS system used to create relation database tables and import into </a:t>
-            </a:r>
-            <a:r>
-              <a:rPr lang="en-US" dirty="0" err="1" smtClean="0"/>
-              <a:t>Sqoop</a:t>
-            </a:r>
-            <a:endParaRPr lang="en-US" dirty="0" smtClean="0"/>
-          </a:p>
-          <a:p>
-            <a:pPr lvl="1"/>
-            <a:r>
-              <a:rPr lang="en-US" dirty="0" smtClean="0"/>
-              <a:t>Download JDBC drivers and copy to the </a:t>
-            </a:r>
-            <a:r>
-              <a:rPr lang="en-US" dirty="0" err="1" smtClean="0"/>
-              <a:t>sqoop</a:t>
-            </a:r>
-            <a:r>
-              <a:rPr lang="en-US" dirty="0" smtClean="0"/>
-              <a:t> lib folder </a:t>
-            </a:r>
-          </a:p>
-          <a:p>
-            <a:pPr lvl="2"/>
-            <a:r>
-              <a:rPr lang="en-US" dirty="0"/>
-              <a:t>http://www.mysql.com/downloads/connector/j/</a:t>
-            </a:r>
-            <a:endParaRPr lang="en-US" dirty="0" smtClean="0"/>
-          </a:p>
-          <a:p>
-            <a:pPr lvl="2"/>
-            <a:r>
-              <a:rPr lang="en-US" dirty="0" smtClean="0"/>
-              <a:t>(e.g. /</a:t>
-            </a:r>
-            <a:r>
-              <a:rPr lang="en-US" dirty="0" err="1" smtClean="0"/>
+              <a:rPr lang="en-US" dirty="0" err="1">
+                <a:latin typeface="Courier New" pitchFamily="49" charset="0"/>
+                <a:cs typeface="Courier New" pitchFamily="49" charset="0"/>
+              </a:rPr>
+              <a:t>s</a:t>
+            </a:r>
+            <a:r>
+              <a:rPr lang="en-US" dirty="0" err="1" smtClean="0">
+                <a:latin typeface="Courier New" pitchFamily="49" charset="0"/>
+                <a:cs typeface="Courier New" pitchFamily="49" charset="0"/>
+              </a:rPr>
+              <a:t>qoop</a:t>
+            </a:r>
+            <a:r>
+              <a:rPr lang="en-US" dirty="0" smtClean="0">
+                <a:latin typeface="Courier New" pitchFamily="49" charset="0"/>
+                <a:cs typeface="Courier New" pitchFamily="49" charset="0"/>
+              </a:rPr>
+              <a:t> export –connect </a:t>
+            </a:r>
+            <a:r>
+              <a:rPr lang="en-US" dirty="0" err="1" smtClean="0">
+                <a:latin typeface="Courier New" pitchFamily="49" charset="0"/>
+                <a:cs typeface="Courier New" pitchFamily="49" charset="0"/>
+              </a:rPr>
+              <a:t>jdbc:mysql</a:t>
+            </a:r>
+            <a:r>
+              <a:rPr lang="en-US" dirty="0" smtClean="0">
+                <a:latin typeface="Courier New" pitchFamily="49" charset="0"/>
+                <a:cs typeface="Courier New" pitchFamily="49" charset="0"/>
+              </a:rPr>
+              <a:t>://localhost:8088/</a:t>
+            </a:r>
+            <a:r>
+              <a:rPr lang="en-US" dirty="0" err="1" smtClean="0">
+                <a:latin typeface="Courier New" pitchFamily="49" charset="0"/>
+                <a:cs typeface="Courier New" pitchFamily="49" charset="0"/>
+              </a:rPr>
+              <a:t>db</a:t>
+            </a:r>
+            <a:r>
+              <a:rPr lang="en-US" dirty="0" smtClean="0">
+                <a:latin typeface="Courier New" pitchFamily="49" charset="0"/>
+                <a:cs typeface="Courier New" pitchFamily="49" charset="0"/>
+              </a:rPr>
+              <a:t> --table </a:t>
+            </a:r>
+            <a:r>
+              <a:rPr lang="en-US" dirty="0" err="1" smtClean="0">
+                <a:latin typeface="Courier New" pitchFamily="49" charset="0"/>
+                <a:cs typeface="Courier New" pitchFamily="49" charset="0"/>
+              </a:rPr>
+              <a:t>tableName</a:t>
+            </a:r>
+            <a:r>
+              <a:rPr lang="en-US" dirty="0" smtClean="0">
+                <a:latin typeface="Courier New" pitchFamily="49" charset="0"/>
+                <a:cs typeface="Courier New" pitchFamily="49" charset="0"/>
+              </a:rPr>
+              <a:t> --username root --password pass –export-</a:t>
+            </a:r>
+            <a:r>
+              <a:rPr lang="en-US" dirty="0" err="1" smtClean="0">
+                <a:latin typeface="Courier New" pitchFamily="49" charset="0"/>
+                <a:cs typeface="Courier New" pitchFamily="49" charset="0"/>
+              </a:rPr>
+              <a:t>dir</a:t>
+            </a:r>
+            <a:r>
+              <a:rPr lang="en-US" dirty="0" smtClean="0">
+                <a:latin typeface="Courier New" pitchFamily="49" charset="0"/>
+                <a:cs typeface="Courier New" pitchFamily="49" charset="0"/>
+              </a:rPr>
+              <a:t> /</a:t>
+            </a:r>
+            <a:r>
+              <a:rPr lang="en-US" dirty="0" err="1" smtClean="0">
+                <a:latin typeface="Courier New" pitchFamily="49" charset="0"/>
+                <a:cs typeface="Courier New" pitchFamily="49" charset="0"/>
+              </a:rPr>
               <a:t>usr</a:t>
             </a:r>
             <a:r>
-              <a:rPr lang="en-US" dirty="0" smtClean="0"/>
-              <a:t>/lib/</a:t>
-            </a:r>
-            <a:r>
-              <a:rPr lang="en-US" dirty="0" err="1" smtClean="0"/>
-              <a:t>sqoop</a:t>
-            </a:r>
-            <a:r>
-              <a:rPr lang="en-US" dirty="0" smtClean="0"/>
-              <a:t>/lib)</a:t>
-            </a:r>
-            <a:endParaRPr lang="en-US" dirty="0"/>
+              <a:rPr lang="en-US" dirty="0" smtClean="0">
+                <a:latin typeface="Courier New" pitchFamily="49" charset="0"/>
+                <a:cs typeface="Courier New" pitchFamily="49" charset="0"/>
+              </a:rPr>
+              <a:t>/local/</a:t>
+            </a:r>
+            <a:r>
+              <a:rPr lang="en-US" dirty="0" err="1" smtClean="0">
+                <a:latin typeface="Courier New" pitchFamily="49" charset="0"/>
+                <a:cs typeface="Courier New" pitchFamily="49" charset="0"/>
+              </a:rPr>
+              <a:t>tableName</a:t>
+            </a:r>
+            <a:r>
+              <a:rPr lang="en-US" dirty="0" smtClean="0">
+                <a:latin typeface="Courier New" pitchFamily="49" charset="0"/>
+                <a:cs typeface="Courier New" pitchFamily="49" charset="0"/>
+              </a:rPr>
+              <a:t>  </a:t>
+            </a:r>
+            <a:endParaRPr lang="en-US" dirty="0">
+              <a:latin typeface="Courier New" pitchFamily="49" charset="0"/>
+              <a:cs typeface="Courier New" pitchFamily="49" charset="0"/>
+            </a:endParaRPr>
           </a:p>
         </p:txBody>
       </p:sp>
     </p:spTree>
     <p:extLst>
       <p:ext uri="{BB962C8B-B14F-4D97-AF65-F5344CB8AC3E}">
-        <p14:creationId xmlns:p14="http://schemas.microsoft.com/office/powerpoint/2010/main" val="2615017802"/>
+        <p14:creationId xmlns:p14="http://schemas.microsoft.com/office/powerpoint/2010/main" val="1939304956"/>
       </p:ext>
     </p:extLst>
   </p:cSld>
@@ -9979,7 +9910,7 @@
             <a:pPr algn="ctr"/>
             <a:r>
               <a:rPr lang="en-US" dirty="0" smtClean="0"/>
-              <a:t>Demo (2)</a:t>
+              <a:t>Demo</a:t>
             </a:r>
             <a:endParaRPr lang="en-US" dirty="0"/>
           </a:p>
@@ -9997,225 +9928,151 @@
         </p:nvSpPr>
         <p:spPr/>
         <p:txBody>
-          <a:bodyPr>
-            <a:normAutofit lnSpcReduction="10000"/>
-          </a:bodyPr>
+          <a:bodyPr/>
           <a:lstStyle/>
           <a:p>
-            <a:pPr marL="457200" indent="-457200">
-              <a:buFont typeface="+mj-lt"/>
-              <a:buAutoNum type="arabicPeriod"/>
-            </a:pPr>
             <a:r>
               <a:rPr lang="en-US" dirty="0" smtClean="0"/>
-              <a:t>Create a database in MySQL</a:t>
+              <a:t>Setup</a:t>
             </a:r>
           </a:p>
           <a:p>
             <a:pPr lvl="1"/>
             <a:r>
               <a:rPr lang="en-US" dirty="0" smtClean="0"/>
-              <a:t>Login to MySQL</a:t>
-            </a:r>
+              <a:t>Install </a:t>
+            </a:r>
+            <a:r>
+              <a:rPr lang="en-US" dirty="0" err="1" smtClean="0"/>
+              <a:t>Hadoop</a:t>
+            </a:r>
+            <a:r>
+              <a:rPr lang="en-US" dirty="0" smtClean="0"/>
+              <a:t>, </a:t>
+            </a:r>
+            <a:r>
+              <a:rPr lang="en-US" dirty="0" err="1" smtClean="0"/>
+              <a:t>Hbase</a:t>
+            </a:r>
+            <a:r>
+              <a:rPr lang="en-US" dirty="0" smtClean="0"/>
+              <a:t>, Hive, </a:t>
+            </a:r>
+            <a:r>
+              <a:rPr lang="en-US" dirty="0" err="1" smtClean="0"/>
+              <a:t>Sqoop</a:t>
+            </a:r>
+            <a:endParaRPr lang="en-US" dirty="0" smtClean="0"/>
           </a:p>
           <a:p>
             <a:pPr lvl="1"/>
             <a:r>
-              <a:rPr lang="en-US" dirty="0" err="1" smtClean="0">
-                <a:latin typeface="Courier New" pitchFamily="49" charset="0"/>
-                <a:cs typeface="Courier New" pitchFamily="49" charset="0"/>
-              </a:rPr>
-              <a:t>mysql</a:t>
-            </a:r>
-            <a:r>
-              <a:rPr lang="en-US" dirty="0" smtClean="0">
-                <a:latin typeface="Courier New" pitchFamily="49" charset="0"/>
-                <a:cs typeface="Courier New" pitchFamily="49" charset="0"/>
-              </a:rPr>
-              <a:t> –u root –P </a:t>
-            </a:r>
-            <a:r>
-              <a:rPr lang="en-US" dirty="0" err="1" smtClean="0">
-                <a:latin typeface="Courier New" pitchFamily="49" charset="0"/>
-                <a:cs typeface="Courier New" pitchFamily="49" charset="0"/>
-              </a:rPr>
-              <a:t>mysql</a:t>
-            </a:r>
-            <a:endParaRPr lang="en-US" dirty="0" smtClean="0">
-              <a:latin typeface="Courier New" pitchFamily="49" charset="0"/>
-              <a:cs typeface="Courier New" pitchFamily="49" charset="0"/>
-            </a:endParaRPr>
-          </a:p>
-          <a:p>
-            <a:pPr marL="457200" indent="-457200">
-              <a:buFont typeface="+mj-lt"/>
-              <a:buAutoNum type="arabicPeriod"/>
-            </a:pPr>
-            <a:r>
               <a:rPr lang="en-US" dirty="0" smtClean="0"/>
-              <a:t>Create table</a:t>
-            </a:r>
-          </a:p>
-          <a:p>
-            <a:pPr marL="617220" lvl="1" indent="-342900"/>
+              <a:t>Apache </a:t>
+            </a:r>
+            <a:r>
+              <a:rPr lang="en-US" dirty="0" err="1" smtClean="0"/>
+              <a:t>BigTop</a:t>
+            </a:r>
             <a:r>
               <a:rPr lang="en-US" dirty="0" smtClean="0"/>
-              <a:t>Create database</a:t>
+              <a:t> 0.50</a:t>
+            </a:r>
+          </a:p>
+          <a:p>
+            <a:pPr lvl="2"/>
+            <a:r>
+              <a:rPr lang="en-US" dirty="0" smtClean="0"/>
+              <a:t>bigtop.apache.org</a:t>
+            </a:r>
+          </a:p>
+          <a:p>
+            <a:pPr lvl="2"/>
+            <a:r>
+              <a:rPr lang="en-US" dirty="0" smtClean="0"/>
+              <a:t>Packaging and interoperability between </a:t>
+            </a:r>
+            <a:r>
+              <a:rPr lang="en-US" dirty="0" err="1" smtClean="0"/>
+              <a:t>Hadoop</a:t>
+            </a:r>
+            <a:r>
+              <a:rPr lang="en-US" dirty="0" smtClean="0"/>
+              <a:t> related projects.</a:t>
+            </a:r>
+          </a:p>
+          <a:p>
+            <a:pPr lvl="1"/>
+            <a:r>
+              <a:rPr lang="en-US" dirty="0" smtClean="0"/>
+              <a:t>Install MySQL</a:t>
+            </a:r>
+          </a:p>
+          <a:p>
+            <a:pPr lvl="2"/>
+            <a:r>
+              <a:rPr lang="en-US" dirty="0" smtClean="0"/>
+              <a:t>Open source RDBMS system used to create relation database tables and import into </a:t>
+            </a:r>
+            <a:r>
+              <a:rPr lang="en-US" dirty="0" err="1" smtClean="0"/>
+              <a:t>Sqoop</a:t>
+            </a:r>
+            <a:endParaRPr lang="en-US" dirty="0" smtClean="0"/>
+          </a:p>
+          <a:p>
+            <a:pPr lvl="1"/>
+            <a:r>
+              <a:rPr lang="en-US" dirty="0" smtClean="0"/>
+              <a:t>Download JDBC drivers and copy to the </a:t>
+            </a:r>
+            <a:r>
+              <a:rPr lang="en-US" dirty="0" err="1" smtClean="0"/>
+              <a:t>sqoop</a:t>
+            </a:r>
+            <a:r>
+              <a:rPr lang="en-US" dirty="0" smtClean="0"/>
+              <a:t> lib folder </a:t>
+            </a:r>
+          </a:p>
+          <a:p>
+            <a:pPr lvl="2"/>
+            <a:r>
+              <a:rPr lang="en-US" dirty="0"/>
+              <a:t>http://www.mysql.com/downloads/connector/j/</a:t>
+            </a:r>
+            <a:endParaRPr lang="en-US" dirty="0" smtClean="0"/>
+          </a:p>
+          <a:p>
+            <a:pPr lvl="2"/>
+            <a:r>
+              <a:rPr lang="en-US" dirty="0" smtClean="0"/>
+              <a:t>(e.g. /</a:t>
+            </a:r>
+            <a:r>
+              <a:rPr lang="en-US" dirty="0" err="1" smtClean="0"/>
+              <a:t>usr</a:t>
+            </a:r>
+            <a:r>
+              <a:rPr lang="en-US" dirty="0" smtClean="0"/>
+              <a:t>/lib/</a:t>
+            </a:r>
+            <a:r>
+              <a:rPr lang="en-US" dirty="0" err="1" smtClean="0"/>
+              <a:t>sqoop</a:t>
+            </a:r>
+            <a:r>
+              <a:rPr lang="en-US" dirty="0" smtClean="0"/>
+              <a:t>/lib)</a:t>
             </a:r>
             <a:endParaRPr lang="en-US" dirty="0"/>
-          </a:p>
-          <a:p>
-            <a:pPr marL="617220" lvl="1" indent="-342900"/>
-            <a:r>
-              <a:rPr lang="en-US" dirty="0" smtClean="0">
-                <a:latin typeface="Courier New" pitchFamily="49" charset="0"/>
-                <a:cs typeface="Courier New" pitchFamily="49" charset="0"/>
-              </a:rPr>
-              <a:t>create database </a:t>
-            </a:r>
-            <a:r>
-              <a:rPr lang="en-US" dirty="0" err="1" smtClean="0">
-                <a:latin typeface="Courier New" pitchFamily="49" charset="0"/>
-                <a:cs typeface="Courier New" pitchFamily="49" charset="0"/>
-              </a:rPr>
-              <a:t>sqoop_demo</a:t>
-            </a:r>
-            <a:r>
-              <a:rPr lang="en-US" dirty="0" smtClean="0">
-                <a:latin typeface="Courier New" pitchFamily="49" charset="0"/>
-                <a:cs typeface="Courier New" pitchFamily="49" charset="0"/>
-              </a:rPr>
-              <a:t>;</a:t>
-            </a:r>
-          </a:p>
-          <a:p>
-            <a:pPr marL="617220" lvl="1" indent="-342900"/>
-            <a:r>
-              <a:rPr lang="en-US" dirty="0" smtClean="0">
-                <a:latin typeface="Courier New" pitchFamily="49" charset="0"/>
-                <a:cs typeface="Courier New" pitchFamily="49" charset="0"/>
-              </a:rPr>
-              <a:t>CREATE TABLE orders(id INT, name VARCHAR(30));</a:t>
-            </a:r>
-          </a:p>
-          <a:p>
-            <a:pPr marL="617220" lvl="1" indent="-342900"/>
-            <a:r>
-              <a:rPr lang="en-US" dirty="0" smtClean="0">
-                <a:latin typeface="Courier New" pitchFamily="49" charset="0"/>
-                <a:cs typeface="Courier New" pitchFamily="49" charset="0"/>
-              </a:rPr>
-              <a:t>show tables;</a:t>
-            </a:r>
-            <a:endParaRPr lang="en-US" dirty="0">
-              <a:latin typeface="Courier New" pitchFamily="49" charset="0"/>
-              <a:cs typeface="Courier New" pitchFamily="49" charset="0"/>
-            </a:endParaRPr>
-          </a:p>
-          <a:p>
-            <a:pPr marL="457200" indent="-457200">
-              <a:buFont typeface="+mj-lt"/>
-              <a:buAutoNum type="arabicPeriod"/>
-            </a:pPr>
-            <a:r>
-              <a:rPr lang="en-US" dirty="0" smtClean="0">
-                <a:cs typeface="Courier New" pitchFamily="49" charset="0"/>
-              </a:rPr>
-              <a:t>Insert values into the table</a:t>
-            </a:r>
-          </a:p>
-          <a:p>
-            <a:pPr marL="731520" lvl="1" indent="-457200"/>
-            <a:r>
-              <a:rPr lang="en-US" dirty="0" smtClean="0">
-                <a:latin typeface="Courier New" pitchFamily="49" charset="0"/>
-                <a:cs typeface="Courier New" pitchFamily="49" charset="0"/>
-              </a:rPr>
-              <a:t>INSERT INTO orders(</a:t>
-            </a:r>
-            <a:r>
-              <a:rPr lang="en-US" dirty="0" err="1" smtClean="0">
-                <a:latin typeface="Courier New" pitchFamily="49" charset="0"/>
-                <a:cs typeface="Courier New" pitchFamily="49" charset="0"/>
-              </a:rPr>
-              <a:t>id,name</a:t>
-            </a:r>
-            <a:r>
-              <a:rPr lang="en-US" dirty="0" smtClean="0">
-                <a:latin typeface="Courier New" pitchFamily="49" charset="0"/>
-                <a:cs typeface="Courier New" pitchFamily="49" charset="0"/>
-              </a:rPr>
-              <a:t>) VALUES(1,”orderA”);</a:t>
-            </a:r>
-          </a:p>
-          <a:p>
-            <a:pPr marL="731520" lvl="1" indent="-457200"/>
-            <a:r>
-              <a:rPr lang="en-US" dirty="0">
-                <a:latin typeface="Courier New" pitchFamily="49" charset="0"/>
-                <a:cs typeface="Courier New" pitchFamily="49" charset="0"/>
-              </a:rPr>
-              <a:t>INSERT INTO orders(</a:t>
-            </a:r>
-            <a:r>
-              <a:rPr lang="en-US" dirty="0" err="1">
-                <a:latin typeface="Courier New" pitchFamily="49" charset="0"/>
-                <a:cs typeface="Courier New" pitchFamily="49" charset="0"/>
-              </a:rPr>
-              <a:t>id,name</a:t>
-            </a:r>
-            <a:r>
-              <a:rPr lang="en-US" dirty="0">
-                <a:latin typeface="Courier New" pitchFamily="49" charset="0"/>
-                <a:cs typeface="Courier New" pitchFamily="49" charset="0"/>
-              </a:rPr>
-              <a:t>) </a:t>
-            </a:r>
-            <a:r>
-              <a:rPr lang="en-US" dirty="0" smtClean="0">
-                <a:latin typeface="Courier New" pitchFamily="49" charset="0"/>
-                <a:cs typeface="Courier New" pitchFamily="49" charset="0"/>
-              </a:rPr>
-              <a:t>VALUES(2,”orderB”);</a:t>
-            </a:r>
-          </a:p>
-          <a:p>
-            <a:pPr marL="731520" lvl="1" indent="-457200"/>
-            <a:r>
-              <a:rPr lang="en-US" dirty="0">
-                <a:latin typeface="Courier New" pitchFamily="49" charset="0"/>
-                <a:cs typeface="Courier New" pitchFamily="49" charset="0"/>
-              </a:rPr>
-              <a:t>INSERT INTO orders(</a:t>
-            </a:r>
-            <a:r>
-              <a:rPr lang="en-US" dirty="0" err="1">
-                <a:latin typeface="Courier New" pitchFamily="49" charset="0"/>
-                <a:cs typeface="Courier New" pitchFamily="49" charset="0"/>
-              </a:rPr>
-              <a:t>id,name</a:t>
-            </a:r>
-            <a:r>
-              <a:rPr lang="en-US" dirty="0">
-                <a:latin typeface="Courier New" pitchFamily="49" charset="0"/>
-                <a:cs typeface="Courier New" pitchFamily="49" charset="0"/>
-              </a:rPr>
-              <a:t>) </a:t>
-            </a:r>
-            <a:r>
-              <a:rPr lang="en-US" dirty="0" smtClean="0">
-                <a:latin typeface="Courier New" pitchFamily="49" charset="0"/>
-                <a:cs typeface="Courier New" pitchFamily="49" charset="0"/>
-              </a:rPr>
-              <a:t>VALUES(3,”orderC”);</a:t>
-            </a:r>
           </a:p>
         </p:txBody>
       </p:sp>
     </p:spTree>
     <p:extLst>
       <p:ext uri="{BB962C8B-B14F-4D97-AF65-F5344CB8AC3E}">
-        <p14:creationId xmlns:p14="http://schemas.microsoft.com/office/powerpoint/2010/main" val="714759774"/>
+        <p14:creationId xmlns:p14="http://schemas.microsoft.com/office/powerpoint/2010/main" val="2615017802"/>
       </p:ext>
     </p:extLst>
   </p:cSld>
@@ -10267,7 +10124,7 @@
             <a:pPr algn="ctr"/>
             <a:r>
               <a:rPr lang="en-US" dirty="0" smtClean="0"/>
-              <a:t>Demo (3)</a:t>
+              <a:t>Demo (2)</a:t>
             </a:r>
             <a:endParaRPr lang="en-US" dirty="0"/>
           </a:p>
@@ -10286,464 +10143,224 @@
         <p:spPr/>
         <p:txBody>
           <a:bodyPr>
-            <a:normAutofit fontScale="92500" lnSpcReduction="20000"/>
+            <a:normAutofit lnSpcReduction="10000"/>
           </a:bodyPr>
           <a:lstStyle/>
           <a:p>
             <a:pPr marL="457200" indent="-457200">
-              <a:buAutoNum type="arabicPeriod" startAt="4"/>
+              <a:buFont typeface="+mj-lt"/>
+              <a:buAutoNum type="arabicPeriod"/>
             </a:pPr>
             <a:r>
               <a:rPr lang="en-US" dirty="0" smtClean="0"/>
-              <a:t>Import orders table into HDFS using </a:t>
-            </a:r>
-            <a:r>
-              <a:rPr lang="en-US" dirty="0" err="1" smtClean="0"/>
-              <a:t>Sqoop</a:t>
-            </a:r>
-            <a:endParaRPr lang="en-US" dirty="0" smtClean="0"/>
-          </a:p>
-          <a:p>
-            <a:pPr marL="731520" lvl="1" indent="-457200"/>
+              <a:t>Create a database in MySQL</a:t>
+            </a:r>
+          </a:p>
+          <a:p>
+            <a:pPr lvl="1"/>
+            <a:r>
+              <a:rPr lang="en-US" dirty="0" smtClean="0"/>
+              <a:t>Login to MySQL</a:t>
+            </a:r>
+          </a:p>
+          <a:p>
+            <a:pPr lvl="1"/>
             <a:r>
               <a:rPr lang="en-US" dirty="0" err="1" smtClean="0">
                 <a:latin typeface="Courier New" pitchFamily="49" charset="0"/>
                 <a:cs typeface="Courier New" pitchFamily="49" charset="0"/>
               </a:rPr>
-              <a:t>sqoop</a:t>
+              <a:t>mysql</a:t>
             </a:r>
             <a:r>
               <a:rPr lang="en-US" dirty="0" smtClean="0">
                 <a:latin typeface="Courier New" pitchFamily="49" charset="0"/>
                 <a:cs typeface="Courier New" pitchFamily="49" charset="0"/>
               </a:rPr>
-              <a:t> import --connect </a:t>
+              <a:t> –u root –P </a:t>
             </a:r>
             <a:r>
               <a:rPr lang="en-US" dirty="0" err="1" smtClean="0">
                 <a:latin typeface="Courier New" pitchFamily="49" charset="0"/>
                 <a:cs typeface="Courier New" pitchFamily="49" charset="0"/>
               </a:rPr>
-              <a:t>jdbc:mysql</a:t>
-            </a:r>
+              <a:t>mysql</a:t>
+            </a:r>
+            <a:endParaRPr lang="en-US" dirty="0" smtClean="0">
+              <a:latin typeface="Courier New" pitchFamily="49" charset="0"/>
+              <a:cs typeface="Courier New" pitchFamily="49" charset="0"/>
+            </a:endParaRPr>
+          </a:p>
+          <a:p>
+            <a:pPr marL="457200" indent="-457200">
+              <a:buFont typeface="+mj-lt"/>
+              <a:buAutoNum type="arabicPeriod"/>
+            </a:pPr>
+            <a:r>
+              <a:rPr lang="en-US" dirty="0" smtClean="0"/>
+              <a:t>Create table</a:t>
+            </a:r>
+          </a:p>
+          <a:p>
+            <a:pPr marL="617220" lvl="1" indent="-342900"/>
+            <a:r>
+              <a:rPr lang="en-US" dirty="0" smtClean="0"/>
+              <a:t>Create database</a:t>
+            </a:r>
+            <a:endParaRPr lang="en-US" dirty="0"/>
+          </a:p>
+          <a:p>
+            <a:pPr marL="617220" lvl="1" indent="-342900"/>
             <a:r>
               <a:rPr lang="en-US" dirty="0" smtClean="0">
                 <a:latin typeface="Courier New" pitchFamily="49" charset="0"/>
                 <a:cs typeface="Courier New" pitchFamily="49" charset="0"/>
               </a:rPr>
-              <a:t>://</a:t>
+              <a:t>create database </a:t>
             </a:r>
             <a:r>
               <a:rPr lang="en-US" dirty="0" err="1" smtClean="0">
                 <a:latin typeface="Courier New" pitchFamily="49" charset="0"/>
                 <a:cs typeface="Courier New" pitchFamily="49" charset="0"/>
               </a:rPr>
-              <a:t>localhost</a:t>
+              <a:t>sqoop_demo</a:t>
             </a:r>
             <a:r>
               <a:rPr lang="en-US" dirty="0" smtClean="0">
                 <a:latin typeface="Courier New" pitchFamily="49" charset="0"/>
                 <a:cs typeface="Courier New" pitchFamily="49" charset="0"/>
               </a:rPr>
-              <a:t>/</a:t>
-            </a:r>
-            <a:r>
-              <a:rPr lang="en-US" dirty="0" err="1" smtClean="0">
-                <a:latin typeface="Courier New" pitchFamily="49" charset="0"/>
-                <a:cs typeface="Courier New" pitchFamily="49" charset="0"/>
-              </a:rPr>
-              <a:t>sqoop_demo</a:t>
-            </a:r>
+              <a:t>;</a:t>
+            </a:r>
+          </a:p>
+          <a:p>
+            <a:pPr marL="617220" lvl="1" indent="-342900"/>
             <a:r>
               <a:rPr lang="en-US" dirty="0" smtClean="0">
                 <a:latin typeface="Courier New" pitchFamily="49" charset="0"/>
                 <a:cs typeface="Courier New" pitchFamily="49" charset="0"/>
               </a:rPr>
-              <a:t> --table orders --username root --target-</a:t>
-            </a:r>
-            <a:r>
-              <a:rPr lang="en-US" dirty="0" err="1" smtClean="0">
-                <a:latin typeface="Courier New" pitchFamily="49" charset="0"/>
-                <a:cs typeface="Courier New" pitchFamily="49" charset="0"/>
-              </a:rPr>
-              <a:t>dir</a:t>
-            </a:r>
+              <a:t>CREATE TABLE orders(id INT, name VARCHAR(30));</a:t>
+            </a:r>
+          </a:p>
+          <a:p>
+            <a:pPr marL="617220" lvl="1" indent="-342900"/>
             <a:r>
               <a:rPr lang="en-US" dirty="0" smtClean="0">
                 <a:latin typeface="Courier New" pitchFamily="49" charset="0"/>
                 <a:cs typeface="Courier New" pitchFamily="49" charset="0"/>
               </a:rPr>
-              <a:t> /</a:t>
-            </a:r>
-            <a:r>
-              <a:rPr lang="en-US" dirty="0" err="1" smtClean="0">
-                <a:latin typeface="Courier New" pitchFamily="49" charset="0"/>
-                <a:cs typeface="Courier New" pitchFamily="49" charset="0"/>
-              </a:rPr>
-              <a:t>usr</a:t>
-            </a:r>
-            <a:r>
-              <a:rPr lang="en-US" dirty="0" smtClean="0">
-                <a:latin typeface="Courier New" pitchFamily="49" charset="0"/>
-                <a:cs typeface="Courier New" pitchFamily="49" charset="0"/>
-              </a:rPr>
-              <a:t>/local/orders –m 1</a:t>
-            </a:r>
-          </a:p>
-          <a:p>
-            <a:pPr marL="731520" lvl="1" indent="-457200"/>
-            <a:r>
-              <a:rPr lang="en-US" dirty="0" smtClean="0">
-                <a:cs typeface="Courier New" pitchFamily="49" charset="0"/>
-              </a:rPr>
-              <a:t>Files are created in HDFS with the data from the table.</a:t>
-            </a:r>
-          </a:p>
-          <a:p>
-            <a:pPr marL="731520" lvl="1" indent="-457200"/>
-            <a:r>
-              <a:rPr lang="en-US" dirty="0" smtClean="0">
-                <a:cs typeface="Courier New" pitchFamily="49" charset="0"/>
-              </a:rPr>
-              <a:t>To read the files enter the command:</a:t>
-            </a:r>
-          </a:p>
-          <a:p>
-            <a:pPr marL="731520" lvl="1" indent="-457200"/>
-            <a:r>
-              <a:rPr lang="en-US" dirty="0" err="1">
-                <a:latin typeface="Courier New" pitchFamily="49" charset="0"/>
-                <a:cs typeface="Courier New" pitchFamily="49" charset="0"/>
-              </a:rPr>
-              <a:t>h</a:t>
-            </a:r>
-            <a:r>
-              <a:rPr lang="en-US" dirty="0" err="1" smtClean="0">
-                <a:latin typeface="Courier New" pitchFamily="49" charset="0"/>
-                <a:cs typeface="Courier New" pitchFamily="49" charset="0"/>
-              </a:rPr>
-              <a:t>adoop</a:t>
-            </a:r>
-            <a:r>
-              <a:rPr lang="en-US" dirty="0" smtClean="0">
-                <a:latin typeface="Courier New" pitchFamily="49" charset="0"/>
-                <a:cs typeface="Courier New" pitchFamily="49" charset="0"/>
-              </a:rPr>
-              <a:t> </a:t>
-            </a:r>
-            <a:r>
-              <a:rPr lang="en-US" dirty="0" err="1" smtClean="0">
-                <a:latin typeface="Courier New" pitchFamily="49" charset="0"/>
-                <a:cs typeface="Courier New" pitchFamily="49" charset="0"/>
-              </a:rPr>
-              <a:t>fs</a:t>
-            </a:r>
-            <a:r>
-              <a:rPr lang="en-US" dirty="0" smtClean="0">
-                <a:latin typeface="Courier New" pitchFamily="49" charset="0"/>
-                <a:cs typeface="Courier New" pitchFamily="49" charset="0"/>
-              </a:rPr>
-              <a:t> –</a:t>
-            </a:r>
-            <a:r>
-              <a:rPr lang="en-US" dirty="0" err="1" smtClean="0">
-                <a:latin typeface="Courier New" pitchFamily="49" charset="0"/>
-                <a:cs typeface="Courier New" pitchFamily="49" charset="0"/>
-              </a:rPr>
-              <a:t>ls</a:t>
-            </a:r>
-            <a:r>
-              <a:rPr lang="en-US" dirty="0" smtClean="0">
-                <a:latin typeface="Courier New" pitchFamily="49" charset="0"/>
-                <a:cs typeface="Courier New" pitchFamily="49" charset="0"/>
-              </a:rPr>
-              <a:t> /</a:t>
-            </a:r>
-            <a:r>
-              <a:rPr lang="en-US" dirty="0" err="1" smtClean="0">
-                <a:latin typeface="Courier New" pitchFamily="49" charset="0"/>
-                <a:cs typeface="Courier New" pitchFamily="49" charset="0"/>
-              </a:rPr>
-              <a:t>usr</a:t>
-            </a:r>
-            <a:r>
-              <a:rPr lang="en-US" dirty="0" smtClean="0">
-                <a:latin typeface="Courier New" pitchFamily="49" charset="0"/>
-                <a:cs typeface="Courier New" pitchFamily="49" charset="0"/>
-              </a:rPr>
-              <a:t>/local/orders</a:t>
-            </a:r>
-          </a:p>
-          <a:p>
-            <a:pPr marL="731520" lvl="1" indent="-457200"/>
-            <a:r>
-              <a:rPr lang="en-US" dirty="0" smtClean="0">
-                <a:latin typeface="Courier New" pitchFamily="49" charset="0"/>
-                <a:cs typeface="Courier New" pitchFamily="49" charset="0"/>
-              </a:rPr>
-              <a:t>Example output:</a:t>
-            </a:r>
-          </a:p>
-          <a:p>
-            <a:pPr marL="1097280" lvl="2" indent="-457200"/>
-            <a:r>
-              <a:rPr lang="en-US" dirty="0">
-                <a:latin typeface="Courier New" pitchFamily="49" charset="0"/>
-                <a:cs typeface="Courier New" pitchFamily="49" charset="0"/>
-              </a:rPr>
-              <a:t>Found 3 items</a:t>
-            </a:r>
-          </a:p>
-          <a:p>
-            <a:pPr marL="1097280" lvl="2" indent="-457200"/>
-            <a:r>
-              <a:rPr lang="en-US" dirty="0">
-                <a:latin typeface="Courier New" pitchFamily="49" charset="0"/>
-                <a:cs typeface="Courier New" pitchFamily="49" charset="0"/>
-              </a:rPr>
-              <a:t>-</a:t>
-            </a:r>
-            <a:r>
-              <a:rPr lang="en-US" dirty="0" err="1">
-                <a:latin typeface="Courier New" pitchFamily="49" charset="0"/>
-                <a:cs typeface="Courier New" pitchFamily="49" charset="0"/>
-              </a:rPr>
-              <a:t>rw</a:t>
-            </a:r>
-            <a:r>
-              <a:rPr lang="en-US" dirty="0">
-                <a:latin typeface="Courier New" pitchFamily="49" charset="0"/>
-                <a:cs typeface="Courier New" pitchFamily="49" charset="0"/>
-              </a:rPr>
-              <a:t>-r–r–   1 </a:t>
-            </a:r>
-            <a:r>
-              <a:rPr lang="en-US" dirty="0" smtClean="0">
-                <a:latin typeface="Courier New" pitchFamily="49" charset="0"/>
-                <a:cs typeface="Courier New" pitchFamily="49" charset="0"/>
-              </a:rPr>
-              <a:t>local </a:t>
-            </a:r>
-            <a:r>
-              <a:rPr lang="en-US" dirty="0" err="1">
-                <a:latin typeface="Courier New" pitchFamily="49" charset="0"/>
-                <a:cs typeface="Courier New" pitchFamily="49" charset="0"/>
-              </a:rPr>
-              <a:t>supergroup</a:t>
-            </a:r>
-            <a:r>
-              <a:rPr lang="en-US" dirty="0">
-                <a:latin typeface="Courier New" pitchFamily="49" charset="0"/>
-                <a:cs typeface="Courier New" pitchFamily="49" charset="0"/>
-              </a:rPr>
-              <a:t>          0 </a:t>
-            </a:r>
-            <a:r>
-              <a:rPr lang="en-US" dirty="0" smtClean="0">
-                <a:latin typeface="Courier New" pitchFamily="49" charset="0"/>
-                <a:cs typeface="Courier New" pitchFamily="49" charset="0"/>
-              </a:rPr>
-              <a:t>2013-10-28 </a:t>
-            </a:r>
-            <a:r>
-              <a:rPr lang="en-US" dirty="0">
-                <a:latin typeface="Courier New" pitchFamily="49" charset="0"/>
-                <a:cs typeface="Courier New" pitchFamily="49" charset="0"/>
-              </a:rPr>
-              <a:t>13:23 /</a:t>
-            </a:r>
-            <a:r>
-              <a:rPr lang="en-US" dirty="0" err="1" smtClean="0">
-                <a:latin typeface="Courier New" pitchFamily="49" charset="0"/>
-                <a:cs typeface="Courier New" pitchFamily="49" charset="0"/>
-              </a:rPr>
-              <a:t>usr</a:t>
-            </a:r>
-            <a:r>
-              <a:rPr lang="en-US" dirty="0" smtClean="0">
-                <a:latin typeface="Courier New" pitchFamily="49" charset="0"/>
-                <a:cs typeface="Courier New" pitchFamily="49" charset="0"/>
-              </a:rPr>
-              <a:t>/local/orders/_</a:t>
-            </a:r>
-            <a:r>
-              <a:rPr lang="en-US" dirty="0">
-                <a:latin typeface="Courier New" pitchFamily="49" charset="0"/>
-                <a:cs typeface="Courier New" pitchFamily="49" charset="0"/>
-              </a:rPr>
-              <a:t>SUCCESS</a:t>
-            </a:r>
-          </a:p>
-          <a:p>
-            <a:pPr marL="1097280" lvl="2" indent="-457200"/>
-            <a:r>
-              <a:rPr lang="en-US" dirty="0" err="1">
-                <a:latin typeface="Courier New" pitchFamily="49" charset="0"/>
-                <a:cs typeface="Courier New" pitchFamily="49" charset="0"/>
-              </a:rPr>
-              <a:t>drwxr</a:t>
-            </a:r>
-            <a:r>
-              <a:rPr lang="en-US" dirty="0">
-                <a:latin typeface="Courier New" pitchFamily="49" charset="0"/>
-                <a:cs typeface="Courier New" pitchFamily="49" charset="0"/>
-              </a:rPr>
-              <a:t>-</a:t>
-            </a:r>
-            <a:r>
-              <a:rPr lang="en-US" dirty="0" err="1">
-                <a:latin typeface="Courier New" pitchFamily="49" charset="0"/>
-                <a:cs typeface="Courier New" pitchFamily="49" charset="0"/>
-              </a:rPr>
-              <a:t>xr</a:t>
-            </a:r>
-            <a:r>
-              <a:rPr lang="en-US" dirty="0">
-                <a:latin typeface="Courier New" pitchFamily="49" charset="0"/>
-                <a:cs typeface="Courier New" pitchFamily="49" charset="0"/>
-              </a:rPr>
-              <a:t>-x   – </a:t>
-            </a:r>
-            <a:r>
-              <a:rPr lang="en-US" dirty="0" smtClean="0">
-                <a:latin typeface="Courier New" pitchFamily="49" charset="0"/>
-                <a:cs typeface="Courier New" pitchFamily="49" charset="0"/>
-              </a:rPr>
-              <a:t>local </a:t>
-            </a:r>
-            <a:r>
-              <a:rPr lang="en-US" dirty="0" err="1">
-                <a:latin typeface="Courier New" pitchFamily="49" charset="0"/>
-                <a:cs typeface="Courier New" pitchFamily="49" charset="0"/>
-              </a:rPr>
-              <a:t>supergroup</a:t>
-            </a:r>
-            <a:r>
-              <a:rPr lang="en-US" dirty="0">
-                <a:latin typeface="Courier New" pitchFamily="49" charset="0"/>
-                <a:cs typeface="Courier New" pitchFamily="49" charset="0"/>
-              </a:rPr>
-              <a:t>          0 </a:t>
-            </a:r>
-            <a:r>
-              <a:rPr lang="en-US" dirty="0" smtClean="0">
-                <a:latin typeface="Courier New" pitchFamily="49" charset="0"/>
-                <a:cs typeface="Courier New" pitchFamily="49" charset="0"/>
-              </a:rPr>
-              <a:t>2013-10-28 </a:t>
-            </a:r>
-            <a:r>
-              <a:rPr lang="en-US" dirty="0">
-                <a:latin typeface="Courier New" pitchFamily="49" charset="0"/>
-                <a:cs typeface="Courier New" pitchFamily="49" charset="0"/>
-              </a:rPr>
-              <a:t>13:23 /</a:t>
-            </a:r>
-            <a:r>
-              <a:rPr lang="en-US" dirty="0" err="1" smtClean="0">
-                <a:latin typeface="Courier New" pitchFamily="49" charset="0"/>
-                <a:cs typeface="Courier New" pitchFamily="49" charset="0"/>
-              </a:rPr>
-              <a:t>usr</a:t>
-            </a:r>
-            <a:r>
-              <a:rPr lang="en-US" dirty="0" smtClean="0">
-                <a:latin typeface="Courier New" pitchFamily="49" charset="0"/>
-                <a:cs typeface="Courier New" pitchFamily="49" charset="0"/>
-              </a:rPr>
-              <a:t>/local/orders/_</a:t>
-            </a:r>
-            <a:r>
-              <a:rPr lang="en-US" dirty="0">
-                <a:latin typeface="Courier New" pitchFamily="49" charset="0"/>
-                <a:cs typeface="Courier New" pitchFamily="49" charset="0"/>
-              </a:rPr>
-              <a:t>logs</a:t>
-            </a:r>
-          </a:p>
-          <a:p>
-            <a:pPr marL="1097280" lvl="2" indent="-457200"/>
-            <a:r>
-              <a:rPr lang="en-US" dirty="0">
-                <a:latin typeface="Courier New" pitchFamily="49" charset="0"/>
-                <a:cs typeface="Courier New" pitchFamily="49" charset="0"/>
-              </a:rPr>
-              <a:t>-</a:t>
-            </a:r>
-            <a:r>
-              <a:rPr lang="en-US" dirty="0" err="1">
-                <a:latin typeface="Courier New" pitchFamily="49" charset="0"/>
-                <a:cs typeface="Courier New" pitchFamily="49" charset="0"/>
-              </a:rPr>
-              <a:t>rw</a:t>
-            </a:r>
-            <a:r>
-              <a:rPr lang="en-US" dirty="0">
-                <a:latin typeface="Courier New" pitchFamily="49" charset="0"/>
-                <a:cs typeface="Courier New" pitchFamily="49" charset="0"/>
-              </a:rPr>
-              <a:t>-r–r–   1 </a:t>
-            </a:r>
-            <a:r>
-              <a:rPr lang="en-US" dirty="0" smtClean="0">
-                <a:latin typeface="Courier New" pitchFamily="49" charset="0"/>
-                <a:cs typeface="Courier New" pitchFamily="49" charset="0"/>
-              </a:rPr>
-              <a:t>local </a:t>
-            </a:r>
-            <a:r>
-              <a:rPr lang="en-US" dirty="0" err="1">
-                <a:latin typeface="Courier New" pitchFamily="49" charset="0"/>
-                <a:cs typeface="Courier New" pitchFamily="49" charset="0"/>
-              </a:rPr>
-              <a:t>supergroup</a:t>
-            </a:r>
-            <a:r>
-              <a:rPr lang="en-US" dirty="0">
-                <a:latin typeface="Courier New" pitchFamily="49" charset="0"/>
-                <a:cs typeface="Courier New" pitchFamily="49" charset="0"/>
-              </a:rPr>
-              <a:t>         60 </a:t>
-            </a:r>
-            <a:r>
-              <a:rPr lang="en-US" dirty="0" smtClean="0">
-                <a:latin typeface="Courier New" pitchFamily="49" charset="0"/>
-                <a:cs typeface="Courier New" pitchFamily="49" charset="0"/>
-              </a:rPr>
-              <a:t>2013-10-28 </a:t>
-            </a:r>
-            <a:r>
-              <a:rPr lang="en-US" dirty="0">
-                <a:latin typeface="Courier New" pitchFamily="49" charset="0"/>
-                <a:cs typeface="Courier New" pitchFamily="49" charset="0"/>
-              </a:rPr>
-              <a:t>13:23 /</a:t>
-            </a:r>
-            <a:r>
-              <a:rPr lang="en-US" dirty="0" err="1" smtClean="0">
-                <a:latin typeface="Courier New" pitchFamily="49" charset="0"/>
-                <a:cs typeface="Courier New" pitchFamily="49" charset="0"/>
-              </a:rPr>
-              <a:t>usr</a:t>
-            </a:r>
-            <a:r>
-              <a:rPr lang="en-US" dirty="0" smtClean="0">
-                <a:latin typeface="Courier New" pitchFamily="49" charset="0"/>
-                <a:cs typeface="Courier New" pitchFamily="49" charset="0"/>
-              </a:rPr>
-              <a:t>/local/orders/part-m-00000</a:t>
+              <a:t>show tables;</a:t>
             </a:r>
             <a:endParaRPr lang="en-US" dirty="0">
               <a:latin typeface="Courier New" pitchFamily="49" charset="0"/>
               <a:cs typeface="Courier New" pitchFamily="49" charset="0"/>
             </a:endParaRPr>
+          </a:p>
+          <a:p>
+            <a:pPr marL="457200" indent="-457200">
+              <a:buFont typeface="+mj-lt"/>
+              <a:buAutoNum type="arabicPeriod"/>
+            </a:pPr>
+            <a:r>
+              <a:rPr lang="en-US" dirty="0" smtClean="0">
+                <a:cs typeface="Courier New" pitchFamily="49" charset="0"/>
+              </a:rPr>
+              <a:t>Insert values into the table</a:t>
+            </a:r>
+          </a:p>
+          <a:p>
+            <a:pPr marL="731520" lvl="1" indent="-457200"/>
+            <a:r>
+              <a:rPr lang="en-US" dirty="0" smtClean="0">
+                <a:latin typeface="Courier New" pitchFamily="49" charset="0"/>
+                <a:cs typeface="Courier New" pitchFamily="49" charset="0"/>
+              </a:rPr>
+              <a:t>INSERT INTO orders(</a:t>
+            </a:r>
+            <a:r>
+              <a:rPr lang="en-US" dirty="0" err="1" smtClean="0">
+                <a:latin typeface="Courier New" pitchFamily="49" charset="0"/>
+                <a:cs typeface="Courier New" pitchFamily="49" charset="0"/>
+              </a:rPr>
+              <a:t>id,name</a:t>
+            </a:r>
+            <a:r>
+              <a:rPr lang="en-US" dirty="0" smtClean="0">
+                <a:latin typeface="Courier New" pitchFamily="49" charset="0"/>
+                <a:cs typeface="Courier New" pitchFamily="49" charset="0"/>
+              </a:rPr>
+              <a:t>) VALUES(1,”orderA”);</a:t>
+            </a:r>
+          </a:p>
+          <a:p>
+            <a:pPr marL="731520" lvl="1" indent="-457200"/>
+            <a:r>
+              <a:rPr lang="en-US" dirty="0">
+                <a:latin typeface="Courier New" pitchFamily="49" charset="0"/>
+                <a:cs typeface="Courier New" pitchFamily="49" charset="0"/>
+              </a:rPr>
+              <a:t>INSERT INTO orders(</a:t>
+            </a:r>
+            <a:r>
+              <a:rPr lang="en-US" dirty="0" err="1">
+                <a:latin typeface="Courier New" pitchFamily="49" charset="0"/>
+                <a:cs typeface="Courier New" pitchFamily="49" charset="0"/>
+              </a:rPr>
+              <a:t>id,name</a:t>
+            </a:r>
+            <a:r>
+              <a:rPr lang="en-US" dirty="0">
+                <a:latin typeface="Courier New" pitchFamily="49" charset="0"/>
+                <a:cs typeface="Courier New" pitchFamily="49" charset="0"/>
+              </a:rPr>
+              <a:t>) </a:t>
+            </a:r>
+            <a:r>
+              <a:rPr lang="en-US" dirty="0" smtClean="0">
+                <a:latin typeface="Courier New" pitchFamily="49" charset="0"/>
+                <a:cs typeface="Courier New" pitchFamily="49" charset="0"/>
+              </a:rPr>
+              <a:t>VALUES(2,”orderB”);</a:t>
+            </a:r>
+          </a:p>
+          <a:p>
+            <a:pPr marL="731520" lvl="1" indent="-457200"/>
+            <a:r>
+              <a:rPr lang="en-US" dirty="0">
+                <a:latin typeface="Courier New" pitchFamily="49" charset="0"/>
+                <a:cs typeface="Courier New" pitchFamily="49" charset="0"/>
+              </a:rPr>
+              <a:t>INSERT INTO orders(</a:t>
+            </a:r>
+            <a:r>
+              <a:rPr lang="en-US" dirty="0" err="1">
+                <a:latin typeface="Courier New" pitchFamily="49" charset="0"/>
+                <a:cs typeface="Courier New" pitchFamily="49" charset="0"/>
+              </a:rPr>
+              <a:t>id,name</a:t>
+            </a:r>
+            <a:r>
+              <a:rPr lang="en-US" dirty="0">
+                <a:latin typeface="Courier New" pitchFamily="49" charset="0"/>
+                <a:cs typeface="Courier New" pitchFamily="49" charset="0"/>
+              </a:rPr>
+              <a:t>) </a:t>
+            </a:r>
+            <a:r>
+              <a:rPr lang="en-US" dirty="0" smtClean="0">
+                <a:latin typeface="Courier New" pitchFamily="49" charset="0"/>
+                <a:cs typeface="Courier New" pitchFamily="49" charset="0"/>
+              </a:rPr>
+              <a:t>VALUES(3,”orderC”);</a:t>
+            </a:r>
           </a:p>
         </p:txBody>
       </p:sp>
     </p:spTree>
     <p:extLst>
       <p:ext uri="{BB962C8B-B14F-4D97-AF65-F5344CB8AC3E}">
-        <p14:creationId xmlns:p14="http://schemas.microsoft.com/office/powerpoint/2010/main" val="2495274805"/>
+        <p14:creationId xmlns:p14="http://schemas.microsoft.com/office/powerpoint/2010/main" val="714759774"/>
       </p:ext>
     </p:extLst>
   </p:cSld>
@@ -10795,7 +10412,7 @@
             <a:pPr algn="ctr"/>
             <a:r>
               <a:rPr lang="en-US" dirty="0" smtClean="0"/>
-              <a:t>Demo (4)</a:t>
+              <a:t>Demo (3)</a:t>
             </a:r>
             <a:endParaRPr lang="en-US" dirty="0"/>
           </a:p>
@@ -10814,22 +10431,130 @@
         <p:spPr/>
         <p:txBody>
           <a:bodyPr>
-            <a:normAutofit lnSpcReduction="10000"/>
+            <a:normAutofit fontScale="92500" lnSpcReduction="20000"/>
           </a:bodyPr>
           <a:lstStyle/>
           <a:p>
+            <a:pPr marL="457200" indent="-457200">
+              <a:buAutoNum type="arabicPeriod" startAt="4"/>
+            </a:pPr>
             <a:r>
               <a:rPr lang="en-US" dirty="0" smtClean="0"/>
-              <a:t>Read the ‘part-m-00000’ file to view the results in </a:t>
+              <a:t>Import orders table into HDFS using </a:t>
             </a:r>
             <a:r>
               <a:rPr lang="en-US" dirty="0" err="1" smtClean="0"/>
-              <a:t>Hadoop</a:t>
+              <a:t>Sqoop</a:t>
             </a:r>
             <a:endParaRPr lang="en-US" dirty="0" smtClean="0"/>
           </a:p>
           <a:p>
-            <a:pPr lvl="1"/>
+            <a:pPr marL="731520" lvl="1" indent="-457200"/>
+            <a:r>
+              <a:rPr lang="en-US" dirty="0" err="1" smtClean="0">
+                <a:latin typeface="Courier New" pitchFamily="49" charset="0"/>
+                <a:cs typeface="Courier New" pitchFamily="49" charset="0"/>
+              </a:rPr>
+              <a:t>sqoop</a:t>
+            </a:r>
+            <a:r>
+              <a:rPr lang="en-US" dirty="0" smtClean="0">
+                <a:latin typeface="Courier New" pitchFamily="49" charset="0"/>
+                <a:cs typeface="Courier New" pitchFamily="49" charset="0"/>
+              </a:rPr>
+              <a:t> import --connect </a:t>
+            </a:r>
+            <a:r>
+              <a:rPr lang="en-US" dirty="0" err="1" smtClean="0">
+                <a:latin typeface="Courier New" pitchFamily="49" charset="0"/>
+                <a:cs typeface="Courier New" pitchFamily="49" charset="0"/>
+              </a:rPr>
+              <a:t>jdbc:mysql</a:t>
+            </a:r>
+            <a:r>
+              <a:rPr lang="en-US" dirty="0" smtClean="0">
+                <a:latin typeface="Courier New" pitchFamily="49" charset="0"/>
+                <a:cs typeface="Courier New" pitchFamily="49" charset="0"/>
+              </a:rPr>
+              <a:t>://</a:t>
+            </a:r>
+            <a:r>
+              <a:rPr lang="en-US" dirty="0" err="1" smtClean="0">
+                <a:latin typeface="Courier New" pitchFamily="49" charset="0"/>
+                <a:cs typeface="Courier New" pitchFamily="49" charset="0"/>
+              </a:rPr>
+              <a:t>localhost</a:t>
+            </a:r>
+            <a:r>
+              <a:rPr lang="en-US" dirty="0" smtClean="0">
+                <a:latin typeface="Courier New" pitchFamily="49" charset="0"/>
+                <a:cs typeface="Courier New" pitchFamily="49" charset="0"/>
+              </a:rPr>
+              <a:t>/</a:t>
+            </a:r>
+            <a:r>
+              <a:rPr lang="en-US" dirty="0" err="1" smtClean="0">
+                <a:latin typeface="Courier New" pitchFamily="49" charset="0"/>
+                <a:cs typeface="Courier New" pitchFamily="49" charset="0"/>
+              </a:rPr>
+              <a:t>sqoop_demo</a:t>
+            </a:r>
+            <a:r>
+              <a:rPr lang="en-US" dirty="0" smtClean="0">
+                <a:latin typeface="Courier New" pitchFamily="49" charset="0"/>
+                <a:cs typeface="Courier New" pitchFamily="49" charset="0"/>
+              </a:rPr>
+              <a:t> --table orders --username root --target-</a:t>
+            </a:r>
+            <a:r>
+              <a:rPr lang="en-US" dirty="0" err="1" smtClean="0">
+                <a:latin typeface="Courier New" pitchFamily="49" charset="0"/>
+                <a:cs typeface="Courier New" pitchFamily="49" charset="0"/>
+              </a:rPr>
+              <a:t>dir</a:t>
+            </a:r>
+            <a:r>
+              <a:rPr lang="en-US" dirty="0" smtClean="0">
+                <a:latin typeface="Courier New" pitchFamily="49" charset="0"/>
+                <a:cs typeface="Courier New" pitchFamily="49" charset="0"/>
+              </a:rPr>
+              <a:t> /</a:t>
+            </a:r>
+            <a:r>
+              <a:rPr lang="en-US" dirty="0" err="1" smtClean="0">
+                <a:latin typeface="Courier New" pitchFamily="49" charset="0"/>
+                <a:cs typeface="Courier New" pitchFamily="49" charset="0"/>
+              </a:rPr>
+              <a:t>usr</a:t>
+            </a:r>
+            <a:r>
+              <a:rPr lang="en-US" dirty="0" smtClean="0">
+                <a:latin typeface="Courier New" pitchFamily="49" charset="0"/>
+                <a:cs typeface="Courier New" pitchFamily="49" charset="0"/>
+              </a:rPr>
+              <a:t>/local/orders –m 1</a:t>
+            </a:r>
+          </a:p>
+          <a:p>
+            <a:pPr marL="731520" lvl="1" indent="-457200"/>
+            <a:r>
+              <a:rPr lang="en-US" dirty="0" smtClean="0">
+                <a:cs typeface="Courier New" pitchFamily="49" charset="0"/>
+              </a:rPr>
+              <a:t>Files are created in HDFS with the data from the table.</a:t>
+            </a:r>
+          </a:p>
+          <a:p>
+            <a:pPr marL="731520" lvl="1" indent="-457200"/>
+            <a:r>
+              <a:rPr lang="en-US" dirty="0" smtClean="0">
+                <a:cs typeface="Courier New" pitchFamily="49" charset="0"/>
+              </a:rPr>
+              <a:t>To read the files enter the command:</a:t>
+            </a:r>
+          </a:p>
+          <a:p>
+            <a:pPr marL="731520" lvl="1" indent="-457200"/>
             <a:r>
               <a:rPr lang="en-US" dirty="0" err="1">
                 <a:latin typeface="Courier New" pitchFamily="49" charset="0"/>
@@ -10863,13 +10588,27 @@
                 <a:latin typeface="Courier New" pitchFamily="49" charset="0"/>
                 <a:cs typeface="Courier New" pitchFamily="49" charset="0"/>
               </a:rPr>
-              <a:t> –cat /</a:t>
+              <a:t> –</a:t>
             </a:r>
             <a:r>
               <a:rPr lang="en-US" dirty="0" err="1" smtClean="0">
                 <a:latin typeface="Courier New" pitchFamily="49" charset="0"/>
                 <a:cs typeface="Courier New" pitchFamily="49" charset="0"/>
               </a:rPr>
+              <a:t>ls</a:t>
+            </a:r>
+            <a:r>
+              <a:rPr lang="en-US" dirty="0" smtClean="0">
+                <a:latin typeface="Courier New" pitchFamily="49" charset="0"/>
+                <a:cs typeface="Courier New" pitchFamily="49" charset="0"/>
+              </a:rPr>
+              <a:t> /</a:t>
+            </a:r>
+            <a:r>
+              <a:rPr lang="en-US" dirty="0" err="1" smtClean="0">
+                <a:latin typeface="Courier New" pitchFamily="49" charset="0"/>
+                <a:cs typeface="Courier New" pitchFamily="49" charset="0"/>
+              </a:rPr>
               <a:t>usr</a:t>
             </a:r>
             <a:r>
@@ -10877,243 +10616,267 @@
                 <a:latin typeface="Courier New" pitchFamily="49" charset="0"/>
                 <a:cs typeface="Courier New" pitchFamily="49" charset="0"/>
               </a:rPr>
-              <a:t>/local/orders/part-m-*</a:t>
-            </a:r>
-          </a:p>
-          <a:p>
-            <a:pPr lvl="1"/>
+              <a:t>/local/orders</a:t>
+            </a:r>
+          </a:p>
+          <a:p>
+            <a:pPr marL="731520" lvl="1" indent="-457200"/>
             <a:r>
               <a:rPr lang="en-US" dirty="0" smtClean="0">
                 <a:latin typeface="Courier New" pitchFamily="49" charset="0"/>
                 <a:cs typeface="Courier New" pitchFamily="49" charset="0"/>
               </a:rPr>
-              <a:t>Output:</a:t>
-            </a:r>
-          </a:p>
-          <a:p>
-            <a:pPr lvl="2"/>
+              <a:t>Example output:</a:t>
+            </a:r>
+          </a:p>
+          <a:p>
+            <a:pPr marL="1097280" lvl="2" indent="-457200"/>
+            <a:r>
+              <a:rPr lang="en-US" dirty="0">
+                <a:latin typeface="Courier New" pitchFamily="49" charset="0"/>
+                <a:cs typeface="Courier New" pitchFamily="49" charset="0"/>
+              </a:rPr>
+              <a:t>Found 3 items</a:t>
+            </a:r>
+          </a:p>
+          <a:p>
+            <a:pPr marL="1097280" lvl="2" indent="-457200"/>
+            <a:r>
+              <a:rPr lang="en-US" dirty="0">
+                <a:latin typeface="Courier New" pitchFamily="49" charset="0"/>
+                <a:cs typeface="Courier New" pitchFamily="49" charset="0"/>
+              </a:rPr>
+              <a:t>-</a:t>
+            </a:r>
+            <a:r>
+              <a:rPr lang="en-US" dirty="0" err="1">
+                <a:latin typeface="Courier New" pitchFamily="49" charset="0"/>
+                <a:cs typeface="Courier New" pitchFamily="49" charset="0"/>
+              </a:rPr>
+              <a:t>rw</a:t>
+            </a:r>
+            <a:r>
+              <a:rPr lang="en-US" dirty="0">
+                <a:latin typeface="Courier New" pitchFamily="49" charset="0"/>
+                <a:cs typeface="Courier New" pitchFamily="49" charset="0"/>
+              </a:rPr>
+              <a:t>-r–r–   1 </a:t>
+            </a:r>
             <a:r>
               <a:rPr lang="en-US" dirty="0" smtClean="0">
                 <a:latin typeface="Courier New" pitchFamily="49" charset="0"/>
                 <a:cs typeface="Courier New" pitchFamily="49" charset="0"/>
               </a:rPr>
-              <a:t>1. </a:t>
+              <a:t>local </a:t>
+            </a:r>
+            <a:r>
+              <a:rPr lang="en-US" dirty="0" err="1">
+                <a:latin typeface="Courier New" pitchFamily="49" charset="0"/>
+                <a:cs typeface="Courier New" pitchFamily="49" charset="0"/>
+              </a:rPr>
+              <a:t>supergroup</a:t>
+            </a:r>
+            <a:r>
+              <a:rPr lang="en-US" dirty="0">
+                <a:latin typeface="Courier New" pitchFamily="49" charset="0"/>
+                <a:cs typeface="Courier New" pitchFamily="49" charset="0"/>
+              </a:rPr>
+              <a:t>          0 </a:t>
+            </a:r>
+            <a:r>
+              <a:rPr lang="en-US" dirty="0" smtClean="0">
+                <a:latin typeface="Courier New" pitchFamily="49" charset="0"/>
+                <a:cs typeface="Courier New" pitchFamily="49" charset="0"/>
+              </a:rPr>
+              <a:t>2013-10-28 </a:t>
+            </a:r>
+            <a:r>
+              <a:rPr lang="en-US" dirty="0">
+                <a:latin typeface="Courier New" pitchFamily="49" charset="0"/>
+                <a:cs typeface="Courier New" pitchFamily="49" charset="0"/>
+              </a:rPr>
+              <a:t>13:23 /</a:t>
             </a:r>
             <a:r>
               <a:rPr lang="en-US" dirty="0" err="1" smtClean="0">
                 <a:latin typeface="Courier New" pitchFamily="49" charset="0"/>
                 <a:cs typeface="Courier New" pitchFamily="49" charset="0"/>
               </a:rPr>
-              <a:t>orderA</a:t>
-            </a:r>
-            <a:endParaRPr lang="en-US" dirty="0" smtClean="0">
-              <a:latin typeface="Courier New" pitchFamily="49" charset="0"/>
-              <a:cs typeface="Courier New" pitchFamily="49" charset="0"/>
-            </a:endParaRPr>
-          </a:p>
-          <a:p>
-            <a:pPr lvl="2"/>
+              <a:t>usr</a:t>
+            </a:r>
             <a:r>
               <a:rPr lang="en-US" dirty="0" smtClean="0">
                 <a:latin typeface="Courier New" pitchFamily="49" charset="0"/>
                 <a:cs typeface="Courier New" pitchFamily="49" charset="0"/>
               </a:rPr>
-              <a:t>2. </a:t>
+              <a:t>/local/orders/_</a:t>
+            </a:r>
+            <a:r>
+              <a:rPr lang="en-US" dirty="0">
+                <a:latin typeface="Courier New" pitchFamily="49" charset="0"/>
+                <a:cs typeface="Courier New" pitchFamily="49" charset="0"/>
+              </a:rPr>
+              <a:t>SUCCESS</a:t>
+            </a:r>
+          </a:p>
+          <a:p>
+            <a:pPr marL="1097280" lvl="2" indent="-457200"/>
+            <a:r>
+              <a:rPr lang="en-US" dirty="0" err="1">
+                <a:latin typeface="Courier New" pitchFamily="49" charset="0"/>
+                <a:cs typeface="Courier New" pitchFamily="49" charset="0"/>
+              </a:rPr>
+              <a:t>drwxr</a:t>
+            </a:r>
+            <a:r>
+              <a:rPr lang="en-US" dirty="0">
+                <a:latin typeface="Courier New" pitchFamily="49" charset="0"/>
+                <a:cs typeface="Courier New" pitchFamily="49" charset="0"/>
+              </a:rPr>
+              <a:t>-</a:t>
+            </a:r>
+            <a:r>
+              <a:rPr lang="en-US" dirty="0" err="1">
+                <a:latin typeface="Courier New" pitchFamily="49" charset="0"/>
+                <a:cs typeface="Courier New" pitchFamily="49" charset="0"/>
+              </a:rPr>
+              <a:t>xr</a:t>
+            </a:r>
+            <a:r>
+              <a:rPr lang="en-US" dirty="0">
+                <a:latin typeface="Courier New" pitchFamily="49" charset="0"/>
+                <a:cs typeface="Courier New" pitchFamily="49" charset="0"/>
+              </a:rPr>
+              <a:t>-x   – </a:t>
+            </a:r>
+            <a:r>
+              <a:rPr lang="en-US" dirty="0" smtClean="0">
+                <a:latin typeface="Courier New" pitchFamily="49" charset="0"/>
+                <a:cs typeface="Courier New" pitchFamily="49" charset="0"/>
+              </a:rPr>
+              <a:t>local </a:t>
+            </a:r>
+            <a:r>
+              <a:rPr lang="en-US" dirty="0" err="1">
+                <a:latin typeface="Courier New" pitchFamily="49" charset="0"/>
+                <a:cs typeface="Courier New" pitchFamily="49" charset="0"/>
+              </a:rPr>
+              <a:t>supergroup</a:t>
+            </a:r>
+            <a:r>
+              <a:rPr lang="en-US" dirty="0">
+                <a:latin typeface="Courier New" pitchFamily="49" charset="0"/>
+                <a:cs typeface="Courier New" pitchFamily="49" charset="0"/>
+              </a:rPr>
+              <a:t>          0 </a:t>
+            </a:r>
+            <a:r>
+              <a:rPr lang="en-US" dirty="0" smtClean="0">
+                <a:latin typeface="Courier New" pitchFamily="49" charset="0"/>
+                <a:cs typeface="Courier New" pitchFamily="49" charset="0"/>
+              </a:rPr>
+              <a:t>2013-10-28 </a:t>
+            </a:r>
+            <a:r>
+              <a:rPr lang="en-US" dirty="0">
+                <a:latin typeface="Courier New" pitchFamily="49" charset="0"/>
+                <a:cs typeface="Courier New" pitchFamily="49" charset="0"/>
+              </a:rPr>
+              <a:t>13:23 /</a:t>
             </a:r>
             <a:r>
               <a:rPr lang="en-US" dirty="0" err="1" smtClean="0">
                 <a:latin typeface="Courier New" pitchFamily="49" charset="0"/>
                 <a:cs typeface="Courier New" pitchFamily="49" charset="0"/>
               </a:rPr>
-              <a:t>orderB</a:t>
-            </a:r>
-            <a:endParaRPr lang="en-US" dirty="0" smtClean="0">
-              <a:latin typeface="Courier New" pitchFamily="49" charset="0"/>
-              <a:cs typeface="Courier New" pitchFamily="49" charset="0"/>
-            </a:endParaRPr>
-          </a:p>
-          <a:p>
-            <a:pPr lvl="2"/>
+              <a:t>usr</a:t>
+            </a:r>
             <a:r>
               <a:rPr lang="en-US" dirty="0" smtClean="0">
                 <a:latin typeface="Courier New" pitchFamily="49" charset="0"/>
                 <a:cs typeface="Courier New" pitchFamily="49" charset="0"/>
               </a:rPr>
-              <a:t>3. </a:t>
+              <a:t>/local/orders/_</a:t>
+            </a:r>
+            <a:r>
+              <a:rPr lang="en-US" dirty="0">
+                <a:latin typeface="Courier New" pitchFamily="49" charset="0"/>
+                <a:cs typeface="Courier New" pitchFamily="49" charset="0"/>
+              </a:rPr>
+              <a:t>logs</a:t>
+            </a:r>
+          </a:p>
+          <a:p>
+            <a:pPr marL="1097280" lvl="2" indent="-457200"/>
+            <a:r>
+              <a:rPr lang="en-US" dirty="0">
+                <a:latin typeface="Courier New" pitchFamily="49" charset="0"/>
+                <a:cs typeface="Courier New" pitchFamily="49" charset="0"/>
+              </a:rPr>
+              <a:t>-</a:t>
+            </a:r>
+            <a:r>
+              <a:rPr lang="en-US" dirty="0" err="1">
+                <a:latin typeface="Courier New" pitchFamily="49" charset="0"/>
+                <a:cs typeface="Courier New" pitchFamily="49" charset="0"/>
+              </a:rPr>
+              <a:t>rw</a:t>
+            </a:r>
+            <a:r>
+              <a:rPr lang="en-US" dirty="0">
+                <a:latin typeface="Courier New" pitchFamily="49" charset="0"/>
+                <a:cs typeface="Courier New" pitchFamily="49" charset="0"/>
+              </a:rPr>
+              <a:t>-r–r–   1 </a:t>
+            </a:r>
+            <a:r>
+              <a:rPr lang="en-US" dirty="0" smtClean="0">
+                <a:latin typeface="Courier New" pitchFamily="49" charset="0"/>
+                <a:cs typeface="Courier New" pitchFamily="49" charset="0"/>
+              </a:rPr>
+              <a:t>local </a:t>
+            </a:r>
+            <a:r>
+              <a:rPr lang="en-US" dirty="0" err="1">
+                <a:latin typeface="Courier New" pitchFamily="49" charset="0"/>
+                <a:cs typeface="Courier New" pitchFamily="49" charset="0"/>
+              </a:rPr>
+              <a:t>supergroup</a:t>
+            </a:r>
+            <a:r>
+              <a:rPr lang="en-US" dirty="0">
+                <a:latin typeface="Courier New" pitchFamily="49" charset="0"/>
+                <a:cs typeface="Courier New" pitchFamily="49" charset="0"/>
+              </a:rPr>
+              <a:t>         60 </a:t>
+            </a:r>
+            <a:r>
+              <a:rPr lang="en-US" dirty="0" smtClean="0">
+                <a:latin typeface="Courier New" pitchFamily="49" charset="0"/>
+                <a:cs typeface="Courier New" pitchFamily="49" charset="0"/>
+              </a:rPr>
+              <a:t>2013-10-28 </a:t>
+            </a:r>
+            <a:r>
+              <a:rPr lang="en-US" dirty="0">
+                <a:latin typeface="Courier New" pitchFamily="49" charset="0"/>
+                <a:cs typeface="Courier New" pitchFamily="49" charset="0"/>
+              </a:rPr>
+              <a:t>13:23 /</a:t>
             </a:r>
             <a:r>
               <a:rPr lang="en-US" dirty="0" err="1" smtClean="0">
                 <a:latin typeface="Courier New" pitchFamily="49" charset="0"/>
                 <a:cs typeface="Courier New" pitchFamily="49" charset="0"/>
               </a:rPr>
-              <a:t>orderC</a:t>
-            </a:r>
-            <a:endParaRPr lang="en-US" dirty="0" smtClean="0">
-              <a:latin typeface="Courier New" pitchFamily="49" charset="0"/>
-              <a:cs typeface="Courier New" pitchFamily="49" charset="0"/>
-            </a:endParaRPr>
-          </a:p>
-          <a:p>
-            <a:pPr marL="0" indent="0">
-              <a:buNone/>
-            </a:pPr>
+              <a:t>usr</a:t>
+            </a:r>
             <a:r>
               <a:rPr lang="en-US" dirty="0" smtClean="0">
                 <a:latin typeface="Courier New" pitchFamily="49" charset="0"/>
                 <a:cs typeface="Courier New" pitchFamily="49" charset="0"/>
               </a:rPr>
-              <a:t>5. </a:t>
-            </a:r>
-            <a:r>
-              <a:rPr lang="en-US" dirty="0" smtClean="0">
-                <a:cs typeface="Courier New" pitchFamily="49" charset="0"/>
-              </a:rPr>
-              <a:t>Export data from HDFS into RDBMS (MySQL)</a:t>
-            </a:r>
-          </a:p>
-          <a:p>
-            <a:pPr lvl="1"/>
-            <a:r>
-              <a:rPr lang="en-US" dirty="0" err="1" smtClean="0">
-                <a:latin typeface="Courier New" pitchFamily="49" charset="0"/>
-                <a:cs typeface="Courier New" pitchFamily="49" charset="0"/>
-              </a:rPr>
-              <a:t>Mysql</a:t>
-            </a:r>
-            <a:r>
-              <a:rPr lang="en-US" dirty="0" smtClean="0">
-                <a:latin typeface="Courier New" pitchFamily="49" charset="0"/>
-                <a:cs typeface="Courier New" pitchFamily="49" charset="0"/>
-              </a:rPr>
-              <a:t>&gt; CREATE table </a:t>
-            </a:r>
-            <a:r>
-              <a:rPr lang="en-US" dirty="0" err="1" smtClean="0">
-                <a:latin typeface="Courier New" pitchFamily="49" charset="0"/>
-                <a:cs typeface="Courier New" pitchFamily="49" charset="0"/>
-              </a:rPr>
-              <a:t>orders_exported</a:t>
-            </a:r>
-            <a:r>
-              <a:rPr lang="en-US" dirty="0" smtClean="0">
-                <a:latin typeface="Courier New" pitchFamily="49" charset="0"/>
-                <a:cs typeface="Courier New" pitchFamily="49" charset="0"/>
-              </a:rPr>
-              <a:t>(id INT, name VARCHAR(30));</a:t>
-            </a:r>
-            <a:r>
-              <a:rPr lang="en-US" dirty="0" smtClean="0">
-                <a:cs typeface="Courier New" pitchFamily="49" charset="0"/>
-              </a:rPr>
-              <a:t>    </a:t>
-            </a:r>
-          </a:p>
-          <a:p>
-            <a:pPr lvl="1"/>
-            <a:r>
-              <a:rPr lang="en-US" dirty="0" err="1">
-                <a:latin typeface="Courier New" pitchFamily="49" charset="0"/>
-                <a:cs typeface="Courier New" pitchFamily="49" charset="0"/>
-              </a:rPr>
-              <a:t>s</a:t>
-            </a:r>
-            <a:r>
-              <a:rPr lang="en-US" dirty="0" err="1" smtClean="0">
-                <a:latin typeface="Courier New" pitchFamily="49" charset="0"/>
-                <a:cs typeface="Courier New" pitchFamily="49" charset="0"/>
-              </a:rPr>
-              <a:t>qoop</a:t>
-            </a:r>
-            <a:r>
-              <a:rPr lang="en-US" dirty="0" smtClean="0">
-                <a:latin typeface="Courier New" pitchFamily="49" charset="0"/>
-                <a:cs typeface="Courier New" pitchFamily="49" charset="0"/>
-              </a:rPr>
-              <a:t> export --connect </a:t>
-            </a:r>
-            <a:r>
-              <a:rPr lang="en-US" dirty="0" err="1" smtClean="0">
-                <a:latin typeface="Courier New" pitchFamily="49" charset="0"/>
-                <a:cs typeface="Courier New" pitchFamily="49" charset="0"/>
-              </a:rPr>
-              <a:t>jdbc:mysql</a:t>
-            </a:r>
-            <a:r>
-              <a:rPr lang="en-US" dirty="0" smtClean="0">
-                <a:latin typeface="Courier New" pitchFamily="49" charset="0"/>
-                <a:cs typeface="Courier New" pitchFamily="49" charset="0"/>
-              </a:rPr>
-              <a:t>://</a:t>
-            </a:r>
-            <a:r>
-              <a:rPr lang="en-US" dirty="0" err="1" smtClean="0">
-                <a:latin typeface="Courier New" pitchFamily="49" charset="0"/>
-                <a:cs typeface="Courier New" pitchFamily="49" charset="0"/>
-              </a:rPr>
-              <a:t>localhost</a:t>
-            </a:r>
-            <a:r>
-              <a:rPr lang="en-US" dirty="0" smtClean="0">
-                <a:latin typeface="Courier New" pitchFamily="49" charset="0"/>
-                <a:cs typeface="Courier New" pitchFamily="49" charset="0"/>
-              </a:rPr>
-              <a:t>/</a:t>
-            </a:r>
-            <a:r>
-              <a:rPr lang="en-US" dirty="0" err="1" smtClean="0">
-                <a:latin typeface="Courier New" pitchFamily="49" charset="0"/>
-                <a:cs typeface="Courier New" pitchFamily="49" charset="0"/>
-              </a:rPr>
-              <a:t>sqoop_demo</a:t>
-            </a:r>
-            <a:r>
-              <a:rPr lang="en-US" dirty="0" smtClean="0">
-                <a:latin typeface="Courier New" pitchFamily="49" charset="0"/>
-                <a:cs typeface="Courier New" pitchFamily="49" charset="0"/>
-              </a:rPr>
-              <a:t> --table orders </a:t>
-            </a:r>
-            <a:r>
-              <a:rPr lang="en-US" dirty="0" err="1" smtClean="0">
-                <a:latin typeface="Courier New" pitchFamily="49" charset="0"/>
-                <a:cs typeface="Courier New" pitchFamily="49" charset="0"/>
-              </a:rPr>
-              <a:t>orders_exported</a:t>
-            </a:r>
-            <a:r>
-              <a:rPr lang="en-US" dirty="0" smtClean="0">
-                <a:latin typeface="Courier New" pitchFamily="49" charset="0"/>
-                <a:cs typeface="Courier New" pitchFamily="49" charset="0"/>
-              </a:rPr>
-              <a:t> --export-</a:t>
-            </a:r>
-            <a:r>
-              <a:rPr lang="en-US" dirty="0" err="1" smtClean="0">
-                <a:latin typeface="Courier New" pitchFamily="49" charset="0"/>
-                <a:cs typeface="Courier New" pitchFamily="49" charset="0"/>
-              </a:rPr>
-              <a:t>dir</a:t>
-            </a:r>
-            <a:r>
-              <a:rPr lang="en-US" dirty="0" smtClean="0">
-                <a:latin typeface="Courier New" pitchFamily="49" charset="0"/>
-                <a:cs typeface="Courier New" pitchFamily="49" charset="0"/>
-              </a:rPr>
-              <a:t> /</a:t>
-            </a:r>
-            <a:r>
-              <a:rPr lang="en-US" dirty="0" err="1" smtClean="0">
-                <a:latin typeface="Courier New" pitchFamily="49" charset="0"/>
-                <a:cs typeface="Courier New" pitchFamily="49" charset="0"/>
-              </a:rPr>
-              <a:t>usr</a:t>
-            </a:r>
-            <a:r>
-              <a:rPr lang="en-US" dirty="0" smtClean="0">
-                <a:latin typeface="Courier New" pitchFamily="49" charset="0"/>
-                <a:cs typeface="Courier New" pitchFamily="49" charset="0"/>
-              </a:rPr>
-              <a:t>/local/orders –username root –P –m 1 </a:t>
+              <a:t>/local/orders/part-m-00000</a:t>
             </a:r>
             <a:endParaRPr lang="en-US" dirty="0">
               <a:latin typeface="Courier New" pitchFamily="49" charset="0"/>
@@ -11125,7 +10888,7 @@
     </p:spTree>
     <p:extLst>
       <p:ext uri="{BB962C8B-B14F-4D97-AF65-F5344CB8AC3E}">
-        <p14:creationId xmlns:p14="http://schemas.microsoft.com/office/powerpoint/2010/main" val="434443921"/>
+        <p14:creationId xmlns:p14="http://schemas.microsoft.com/office/powerpoint/2010/main" val="2495274805"/>
       </p:ext>
     </p:extLst>
   </p:cSld>
@@ -11177,6 +10940,388 @@
             <a:pPr algn="ctr"/>
             <a:r>
               <a:rPr lang="en-US" dirty="0" smtClean="0"/>
+              <a:t>Demo (4)</a:t>
+            </a:r>
+            <a:endParaRPr lang="en-US" dirty="0"/>
+          </a:p>
+        </p:txBody>
+      </p:sp>
+      <p:sp>
+        <p:nvSpPr>
+          <p:cNvPr id="3" name="Content Placeholder 2"/>
+          <p:cNvSpPr>
+            <a:spLocks noGrp="1"/>
+          </p:cNvSpPr>
+          <p:nvPr>
+            <p:ph idx="1"/>
+          </p:nvPr>
+        </p:nvSpPr>
+        <p:spPr/>
+        <p:txBody>
+          <a:bodyPr>
+            <a:normAutofit lnSpcReduction="10000"/>
+          </a:bodyPr>
+          <a:lstStyle/>
+          <a:p>
+            <a:r>
+              <a:rPr lang="en-US" dirty="0" smtClean="0"/>
+              <a:t>Read the ‘part-m-00000’ file to view the results in </a:t>
+            </a:r>
+            <a:r>
+              <a:rPr lang="en-US" dirty="0" err="1" smtClean="0"/>
+              <a:t>Hadoop</a:t>
+            </a:r>
+            <a:endParaRPr lang="en-US" dirty="0" smtClean="0"/>
+          </a:p>
+          <a:p>
+            <a:pPr lvl="1"/>
+            <a:r>
+              <a:rPr lang="en-US" dirty="0" err="1">
+                <a:latin typeface="Courier New" pitchFamily="49" charset="0"/>
+                <a:cs typeface="Courier New" pitchFamily="49" charset="0"/>
+              </a:rPr>
+              <a:t>h</a:t>
+            </a:r>
+            <a:r>
+              <a:rPr lang="en-US" dirty="0" err="1" smtClean="0">
+                <a:latin typeface="Courier New" pitchFamily="49" charset="0"/>
+                <a:cs typeface="Courier New" pitchFamily="49" charset="0"/>
+              </a:rPr>
+              <a:t>adoop</a:t>
+            </a:r>
+            <a:r>
+              <a:rPr lang="en-US" dirty="0" smtClean="0">
+                <a:latin typeface="Courier New" pitchFamily="49" charset="0"/>
+                <a:cs typeface="Courier New" pitchFamily="49" charset="0"/>
+              </a:rPr>
+              <a:t> </a:t>
+            </a:r>
+            <a:r>
+              <a:rPr lang="en-US" dirty="0" err="1" smtClean="0">
+                <a:latin typeface="Courier New" pitchFamily="49" charset="0"/>
+                <a:cs typeface="Courier New" pitchFamily="49" charset="0"/>
+              </a:rPr>
+              <a:t>fs</a:t>
+            </a:r>
+            <a:r>
+              <a:rPr lang="en-US" dirty="0" smtClean="0">
+                <a:latin typeface="Courier New" pitchFamily="49" charset="0"/>
+                <a:cs typeface="Courier New" pitchFamily="49" charset="0"/>
+              </a:rPr>
+              <a:t> –cat /</a:t>
+            </a:r>
+            <a:r>
+              <a:rPr lang="en-US" dirty="0" err="1" smtClean="0">
+                <a:latin typeface="Courier New" pitchFamily="49" charset="0"/>
+                <a:cs typeface="Courier New" pitchFamily="49" charset="0"/>
+              </a:rPr>
+              <a:t>usr</a:t>
+            </a:r>
+            <a:r>
+              <a:rPr lang="en-US" dirty="0" smtClean="0">
+                <a:latin typeface="Courier New" pitchFamily="49" charset="0"/>
+                <a:cs typeface="Courier New" pitchFamily="49" charset="0"/>
+              </a:rPr>
+              <a:t>/local/orders/part-m-*</a:t>
+            </a:r>
+          </a:p>
+          <a:p>
+            <a:pPr lvl="1"/>
+            <a:r>
+              <a:rPr lang="en-US" dirty="0" smtClean="0">
+                <a:latin typeface="Courier New" pitchFamily="49" charset="0"/>
+                <a:cs typeface="Courier New" pitchFamily="49" charset="0"/>
+              </a:rPr>
+              <a:t>Output:</a:t>
+            </a:r>
+          </a:p>
+          <a:p>
+            <a:pPr lvl="2"/>
+            <a:r>
+              <a:rPr lang="en-US" dirty="0" smtClean="0">
+                <a:latin typeface="Courier New" pitchFamily="49" charset="0"/>
+                <a:cs typeface="Courier New" pitchFamily="49" charset="0"/>
+              </a:rPr>
+              <a:t>1. </a:t>
+            </a:r>
+            <a:r>
+              <a:rPr lang="en-US" dirty="0" err="1" smtClean="0">
+                <a:latin typeface="Courier New" pitchFamily="49" charset="0"/>
+                <a:cs typeface="Courier New" pitchFamily="49" charset="0"/>
+              </a:rPr>
+              <a:t>orderA</a:t>
+            </a:r>
+            <a:endParaRPr lang="en-US" dirty="0" smtClean="0">
+              <a:latin typeface="Courier New" pitchFamily="49" charset="0"/>
+              <a:cs typeface="Courier New" pitchFamily="49" charset="0"/>
+            </a:endParaRPr>
+          </a:p>
+          <a:p>
+            <a:pPr lvl="2"/>
+            <a:r>
+              <a:rPr lang="en-US" dirty="0" smtClean="0">
+                <a:latin typeface="Courier New" pitchFamily="49" charset="0"/>
+                <a:cs typeface="Courier New" pitchFamily="49" charset="0"/>
+              </a:rPr>
+              <a:t>2. </a:t>
+            </a:r>
+            <a:r>
+              <a:rPr lang="en-US" dirty="0" err="1" smtClean="0">
+                <a:latin typeface="Courier New" pitchFamily="49" charset="0"/>
+                <a:cs typeface="Courier New" pitchFamily="49" charset="0"/>
+              </a:rPr>
+              <a:t>orderB</a:t>
+            </a:r>
+            <a:endParaRPr lang="en-US" dirty="0" smtClean="0">
+              <a:latin typeface="Courier New" pitchFamily="49" charset="0"/>
+              <a:cs typeface="Courier New" pitchFamily="49" charset="0"/>
+            </a:endParaRPr>
+          </a:p>
+          <a:p>
+            <a:pPr lvl="2"/>
+            <a:r>
+              <a:rPr lang="en-US" dirty="0" smtClean="0">
+                <a:latin typeface="Courier New" pitchFamily="49" charset="0"/>
+                <a:cs typeface="Courier New" pitchFamily="49" charset="0"/>
+              </a:rPr>
+              <a:t>3. </a:t>
+            </a:r>
+            <a:r>
+              <a:rPr lang="en-US" dirty="0" err="1" smtClean="0">
+                <a:latin typeface="Courier New" pitchFamily="49" charset="0"/>
+                <a:cs typeface="Courier New" pitchFamily="49" charset="0"/>
+              </a:rPr>
+              <a:t>orderC</a:t>
+            </a:r>
+            <a:endParaRPr lang="en-US" dirty="0" smtClean="0">
+              <a:latin typeface="Courier New" pitchFamily="49" charset="0"/>
+              <a:cs typeface="Courier New" pitchFamily="49" charset="0"/>
+            </a:endParaRPr>
+          </a:p>
+          <a:p>
+            <a:pPr marL="0" indent="0">
+              <a:buNone/>
+            </a:pPr>
+            <a:r>
+              <a:rPr lang="en-US" dirty="0" smtClean="0">
+                <a:latin typeface="Courier New" pitchFamily="49" charset="0"/>
+                <a:cs typeface="Courier New" pitchFamily="49" charset="0"/>
+              </a:rPr>
+              <a:t>5. </a:t>
+            </a:r>
+            <a:r>
+              <a:rPr lang="en-US" dirty="0" smtClean="0">
+                <a:cs typeface="Courier New" pitchFamily="49" charset="0"/>
+              </a:rPr>
+              <a:t>Export data from HDFS into RDBMS (MySQL)</a:t>
+            </a:r>
+          </a:p>
+          <a:p>
+            <a:pPr lvl="1"/>
+            <a:r>
+              <a:rPr lang="en-US" dirty="0" err="1" smtClean="0">
+                <a:latin typeface="Courier New" pitchFamily="49" charset="0"/>
+                <a:cs typeface="Courier New" pitchFamily="49" charset="0"/>
+              </a:rPr>
+              <a:t>Mysql</a:t>
+            </a:r>
+            <a:r>
+              <a:rPr lang="en-US" dirty="0" smtClean="0">
+                <a:latin typeface="Courier New" pitchFamily="49" charset="0"/>
+                <a:cs typeface="Courier New" pitchFamily="49" charset="0"/>
+              </a:rPr>
+              <a:t>&gt; CREATE table </a:t>
+            </a:r>
+            <a:r>
+              <a:rPr lang="en-US" dirty="0" err="1" smtClean="0">
+                <a:latin typeface="Courier New" pitchFamily="49" charset="0"/>
+                <a:cs typeface="Courier New" pitchFamily="49" charset="0"/>
+              </a:rPr>
+              <a:t>orders_exported</a:t>
+            </a:r>
+            <a:r>
+              <a:rPr lang="en-US" dirty="0" smtClean="0">
+                <a:latin typeface="Courier New" pitchFamily="49" charset="0"/>
+                <a:cs typeface="Courier New" pitchFamily="49" charset="0"/>
+              </a:rPr>
+              <a:t>(id INT, name VARCHAR(30));</a:t>
+            </a:r>
+            <a:r>
+              <a:rPr lang="en-US" dirty="0" smtClean="0">
+                <a:cs typeface="Courier New" pitchFamily="49" charset="0"/>
+              </a:rPr>
+              <a:t>    </a:t>
+            </a:r>
+          </a:p>
+          <a:p>
+            <a:pPr lvl="1"/>
+            <a:r>
+              <a:rPr lang="en-US" dirty="0" err="1">
+                <a:latin typeface="Courier New" pitchFamily="49" charset="0"/>
+                <a:cs typeface="Courier New" pitchFamily="49" charset="0"/>
+              </a:rPr>
+              <a:t>s</a:t>
+            </a:r>
+            <a:r>
+              <a:rPr lang="en-US" dirty="0" err="1" smtClean="0">
+                <a:latin typeface="Courier New" pitchFamily="49" charset="0"/>
+                <a:cs typeface="Courier New" pitchFamily="49" charset="0"/>
+              </a:rPr>
+              <a:t>qoop</a:t>
+            </a:r>
+            <a:r>
+              <a:rPr lang="en-US" dirty="0" smtClean="0">
+                <a:latin typeface="Courier New" pitchFamily="49" charset="0"/>
+                <a:cs typeface="Courier New" pitchFamily="49" charset="0"/>
+              </a:rPr>
+              <a:t> export --connect </a:t>
+            </a:r>
+            <a:r>
+              <a:rPr lang="en-US" dirty="0" err="1" smtClean="0">
+                <a:latin typeface="Courier New" pitchFamily="49" charset="0"/>
+                <a:cs typeface="Courier New" pitchFamily="49" charset="0"/>
+              </a:rPr>
+              <a:t>jdbc:mysql</a:t>
+            </a:r>
+            <a:r>
+              <a:rPr lang="en-US" dirty="0" smtClean="0">
+                <a:latin typeface="Courier New" pitchFamily="49" charset="0"/>
+                <a:cs typeface="Courier New" pitchFamily="49" charset="0"/>
+              </a:rPr>
+              <a:t>://</a:t>
+            </a:r>
+            <a:r>
+              <a:rPr lang="en-US" dirty="0" err="1" smtClean="0">
+                <a:latin typeface="Courier New" pitchFamily="49" charset="0"/>
+                <a:cs typeface="Courier New" pitchFamily="49" charset="0"/>
+              </a:rPr>
+              <a:t>localhost</a:t>
+            </a:r>
+            <a:r>
+              <a:rPr lang="en-US" dirty="0" smtClean="0">
+                <a:latin typeface="Courier New" pitchFamily="49" charset="0"/>
+                <a:cs typeface="Courier New" pitchFamily="49" charset="0"/>
+              </a:rPr>
+              <a:t>/</a:t>
+            </a:r>
+            <a:r>
+              <a:rPr lang="en-US" dirty="0" err="1" smtClean="0">
+                <a:latin typeface="Courier New" pitchFamily="49" charset="0"/>
+                <a:cs typeface="Courier New" pitchFamily="49" charset="0"/>
+              </a:rPr>
+              <a:t>sqoop_demo</a:t>
+            </a:r>
+            <a:r>
+              <a:rPr lang="en-US" dirty="0" smtClean="0">
+                <a:latin typeface="Courier New" pitchFamily="49" charset="0"/>
+                <a:cs typeface="Courier New" pitchFamily="49" charset="0"/>
+              </a:rPr>
+              <a:t> --table orders </a:t>
+            </a:r>
+            <a:r>
+              <a:rPr lang="en-US" dirty="0" err="1" smtClean="0">
+                <a:latin typeface="Courier New" pitchFamily="49" charset="0"/>
+                <a:cs typeface="Courier New" pitchFamily="49" charset="0"/>
+              </a:rPr>
+              <a:t>orders_exported</a:t>
+            </a:r>
+            <a:r>
+              <a:rPr lang="en-US" dirty="0" smtClean="0">
+                <a:latin typeface="Courier New" pitchFamily="49" charset="0"/>
+                <a:cs typeface="Courier New" pitchFamily="49" charset="0"/>
+              </a:rPr>
+              <a:t> --export-</a:t>
+            </a:r>
+            <a:r>
+              <a:rPr lang="en-US" dirty="0" err="1" smtClean="0">
+                <a:latin typeface="Courier New" pitchFamily="49" charset="0"/>
+                <a:cs typeface="Courier New" pitchFamily="49" charset="0"/>
+              </a:rPr>
+              <a:t>dir</a:t>
+            </a:r>
+            <a:r>
+              <a:rPr lang="en-US" dirty="0" smtClean="0">
+                <a:latin typeface="Courier New" pitchFamily="49" charset="0"/>
+                <a:cs typeface="Courier New" pitchFamily="49" charset="0"/>
+              </a:rPr>
+              <a:t> /</a:t>
+            </a:r>
+            <a:r>
+              <a:rPr lang="en-US" dirty="0" err="1" smtClean="0">
+                <a:latin typeface="Courier New" pitchFamily="49" charset="0"/>
+                <a:cs typeface="Courier New" pitchFamily="49" charset="0"/>
+              </a:rPr>
+              <a:t>usr</a:t>
+            </a:r>
+            <a:r>
+              <a:rPr lang="en-US" dirty="0" smtClean="0">
+                <a:latin typeface="Courier New" pitchFamily="49" charset="0"/>
+                <a:cs typeface="Courier New" pitchFamily="49" charset="0"/>
+              </a:rPr>
+              <a:t>/local/orders –username root –P –m 1 </a:t>
+            </a:r>
+            <a:endParaRPr lang="en-US" dirty="0">
+              <a:latin typeface="Courier New" pitchFamily="49" charset="0"/>
+              <a:cs typeface="Courier New" pitchFamily="49" charset="0"/>
+            </a:endParaRPr>
+          </a:p>
+        </p:txBody>
+      </p:sp>
+    </p:spTree>
+    <p:extLst>
+      <p:ext uri="{BB962C8B-B14F-4D97-AF65-F5344CB8AC3E}">
+        <p14:creationId xmlns:p14="http://schemas.microsoft.com/office/powerpoint/2010/main" val="434443921"/>
+      </p:ext>
+    </p:extLst>
+  </p:cSld>
+  <p:clrMapOvr>
+    <a:masterClrMapping/>
+  </p:clrMapOvr>
+  <p:timing>
+    <p:tnLst>
+      <p:par>
+        <p:cTn id="1" dur="indefinite" restart="never" nodeType="tmRoot"/>
+      </p:par>
+    </p:tnLst>
+  </p:timing>
+</p:sld>
+</file>
+
+<file path=ppt/slides/slide16.xml><?xml version="1.0" encoding="utf-8"?>
+<p:sld xmlns:a="http://schemas.openxmlformats.org/drawingml/2006/main" xmlns:r="http://schemas.openxmlformats.org/officeDocument/2006/relationships" xmlns:p="http://schemas.openxmlformats.org/presentationml/2006/main">
+  <p:cSld>
+    <p:spTree>
+      <p:nvGrpSpPr>
+        <p:cNvPr id="1" name=""/>
+        <p:cNvGrpSpPr/>
+        <p:nvPr/>
+      </p:nvGrpSpPr>
+      <p:grpSpPr>
+        <a:xfrm>
+          <a:off x="0" y="0"/>
+          <a:ext cx="0" cy="0"/>
+          <a:chOff x="0" y="0"/>
+          <a:chExt cx="0" cy="0"/>
+        </a:xfrm>
+      </p:grpSpPr>
+      <p:sp>
+        <p:nvSpPr>
+          <p:cNvPr id="2" name="Title 1"/>
+          <p:cNvSpPr>
+            <a:spLocks noGrp="1"/>
+          </p:cNvSpPr>
+          <p:nvPr>
+            <p:ph type="title"/>
+          </p:nvPr>
+        </p:nvSpPr>
+        <p:spPr/>
+        <p:txBody>
+          <a:bodyPr/>
+          <a:lstStyle/>
+          <a:p>
+            <a:pPr algn="ctr"/>
+            <a:r>
+              <a:rPr lang="en-US" dirty="0" smtClean="0"/>
               <a:t>Demo (5)</a:t>
             </a:r>
             <a:endParaRPr lang="en-US" dirty="0"/>
@@ -11382,7 +11527,7 @@
 </p:sld>
 </file>
 
-<file path=ppt/slides/slide16.xml><?xml version="1.0" encoding="utf-8"?>
+<file path=ppt/slides/slide17.xml><?xml version="1.0" encoding="utf-8"?>
 <p:sld xmlns:a="http://schemas.openxmlformats.org/drawingml/2006/main" xmlns:r="http://schemas.openxmlformats.org/officeDocument/2006/relationships" xmlns:p="http://schemas.openxmlformats.org/presentationml/2006/main">
   <p:cSld>
     <p:spTree>
@@ -12227,8 +12372,26 @@
             <a:pPr lvl="1"/>
             <a:r>
               <a:rPr lang="en-US" dirty="0" smtClean="0"/>
-              <a:t>Additional information about query execution</a:t>
-            </a:r>
+              <a:t>Additional information about query </a:t>
+            </a:r>
+            <a:r>
+              <a:rPr lang="en-US" dirty="0" smtClean="0"/>
+              <a:t>execution</a:t>
+            </a:r>
+          </a:p>
+          <a:p>
+            <a:r>
+              <a:rPr lang="en-US" dirty="0" smtClean="0"/>
+              <a:t>--query</a:t>
+            </a:r>
+          </a:p>
+          <a:p>
+            <a:pPr lvl="1"/>
+            <a:r>
+              <a:rPr lang="en-US" dirty="0" smtClean="0"/>
+              <a:t>Specify your own query instead of selecting all rows/columns</a:t>
+            </a:r>
+            <a:endParaRPr lang="en-US" dirty="0" smtClean="0"/>
           </a:p>
         </p:txBody>
       </p:sp>
@@ -12410,12 +12573,8 @@
           <a:p>
             <a:pPr algn="ctr"/>
             <a:r>
-              <a:rPr lang="en-US" dirty="0" err="1" smtClean="0"/>
-              <a:t>Sqoop</a:t>
-            </a:r>
-            <a:r>
               <a:rPr lang="en-US" dirty="0" smtClean="0"/>
-              <a:t> - Export</a:t>
+              <a:t>Import Examples</a:t>
             </a:r>
             <a:endParaRPr lang="en-US" dirty="0"/>
           </a:p>
@@ -12431,115 +12590,324 @@
             <p:ph idx="1"/>
           </p:nvPr>
         </p:nvSpPr>
-        <p:spPr/>
+        <p:spPr>
+          <a:xfrm>
+            <a:off x="304800" y="1600200"/>
+            <a:ext cx="8610600" cy="4525963"/>
+          </a:xfrm>
+        </p:spPr>
         <p:txBody>
-          <a:bodyPr/>
+          <a:bodyPr>
+            <a:normAutofit fontScale="92500"/>
+          </a:bodyPr>
           <a:lstStyle/>
           <a:p>
             <a:r>
-              <a:rPr lang="en-US" dirty="0" smtClean="0"/>
-              <a:t>Export</a:t>
-            </a:r>
-          </a:p>
-          <a:p>
-            <a:pPr lvl="1"/>
-            <a:r>
-              <a:rPr lang="en-US" dirty="0" smtClean="0"/>
-              <a:t>Moves HDFS data back to RDBMS table</a:t>
-            </a:r>
-          </a:p>
-          <a:p>
-            <a:pPr lvl="1"/>
-            <a:r>
-              <a:rPr lang="en-US" dirty="0" smtClean="0"/>
-              <a:t>Output table must exist in RDBMS before executing export job!</a:t>
-            </a:r>
-          </a:p>
-          <a:p>
-            <a:pPr lvl="1"/>
-            <a:r>
-              <a:rPr lang="en-US" dirty="0" smtClean="0"/>
-              <a:t>Since import process is done parallel, the output files can be a set of files.</a:t>
-            </a:r>
-          </a:p>
-          <a:p>
-            <a:pPr lvl="1"/>
-            <a:r>
-              <a:rPr lang="en-US" dirty="0" smtClean="0"/>
-              <a:t>Reads delimited output files line-by-line</a:t>
-            </a:r>
-          </a:p>
-          <a:p>
-            <a:pPr lvl="2"/>
-            <a:r>
-              <a:rPr lang="en-US" dirty="0"/>
-              <a:t>Parses data into records</a:t>
-            </a:r>
-            <a:endParaRPr lang="en-US" dirty="0" smtClean="0"/>
-          </a:p>
-          <a:p>
-            <a:pPr lvl="2"/>
-            <a:r>
-              <a:rPr lang="en-US" dirty="0" smtClean="0"/>
-              <a:t>Translates into INSERT</a:t>
-            </a:r>
-          </a:p>
-          <a:p>
-            <a:pPr lvl="2"/>
-            <a:r>
-              <a:rPr lang="en-US" dirty="0" smtClean="0"/>
-              <a:t>Inserts the data into the export table</a:t>
-            </a:r>
-          </a:p>
-          <a:p>
-            <a:pPr lvl="2"/>
-            <a:r>
-              <a:rPr lang="en-US" dirty="0" smtClean="0"/>
-              <a:t>Primary key (if exists) must be unique in the file</a:t>
-            </a:r>
-          </a:p>
-          <a:p>
-            <a:pPr lvl="3"/>
-            <a:r>
-              <a:rPr lang="en-US" dirty="0" smtClean="0"/>
-              <a:t>Primary key constraints</a:t>
-            </a:r>
-          </a:p>
-          <a:p>
-            <a:pPr lvl="1"/>
-            <a:r>
-              <a:rPr lang="en-US" dirty="0" smtClean="0"/>
-              <a:t>Export process runs </a:t>
-            </a:r>
-            <a:r>
-              <a:rPr lang="en-US" dirty="0" err="1" smtClean="0"/>
-              <a:t>MapReduce</a:t>
-            </a:r>
-            <a:r>
-              <a:rPr lang="en-US" dirty="0" smtClean="0"/>
-              <a:t> job in parallel </a:t>
-            </a:r>
-            <a:endParaRPr lang="en-US" dirty="0"/>
+              <a:rPr lang="en-US" sz="1800" dirty="0"/>
+              <a:t>$ </a:t>
+            </a:r>
+            <a:r>
+              <a:rPr lang="en-US" sz="1800" dirty="0" err="1"/>
+              <a:t>sqoop</a:t>
+            </a:r>
+            <a:r>
+              <a:rPr lang="en-US" sz="1800" dirty="0"/>
+              <a:t> import --connect </a:t>
+            </a:r>
+            <a:r>
+              <a:rPr lang="en-US" sz="1800" dirty="0" err="1"/>
+              <a:t>jdbc:mysql</a:t>
+            </a:r>
+            <a:r>
+              <a:rPr lang="en-US" sz="1800" dirty="0"/>
+              <a:t>://db.foo.com/</a:t>
+            </a:r>
+            <a:r>
+              <a:rPr lang="en-US" sz="1800" dirty="0" err="1"/>
+              <a:t>corp</a:t>
+            </a:r>
+            <a:r>
+              <a:rPr lang="en-US" sz="1800" dirty="0"/>
+              <a:t> --table EMPLOYEES \ --columns "</a:t>
+            </a:r>
+            <a:r>
+              <a:rPr lang="en-US" sz="1800" dirty="0" err="1" smtClean="0"/>
+              <a:t>employee_id,first_name,last_name,job_title</a:t>
+            </a:r>
+            <a:r>
+              <a:rPr lang="en-US" sz="1800" dirty="0" smtClean="0"/>
+              <a:t>“ --m 8</a:t>
+            </a:r>
+          </a:p>
+          <a:p>
+            <a:pPr marL="0" indent="0">
+              <a:buNone/>
+            </a:pPr>
+            <a:endParaRPr lang="en-US" sz="900" dirty="0" smtClean="0"/>
+          </a:p>
+          <a:p>
+            <a:r>
+              <a:rPr lang="en-US" sz="1800" dirty="0" smtClean="0"/>
+              <a:t>$ </a:t>
+            </a:r>
+            <a:r>
+              <a:rPr lang="en-US" sz="1800" dirty="0" err="1"/>
+              <a:t>sqoop</a:t>
+            </a:r>
+            <a:r>
+              <a:rPr lang="en-US" sz="1800" dirty="0"/>
+              <a:t> import --connect </a:t>
+            </a:r>
+            <a:r>
+              <a:rPr lang="en-US" sz="1800" dirty="0" err="1"/>
+              <a:t>jdbc:mysql</a:t>
+            </a:r>
+            <a:r>
+              <a:rPr lang="en-US" sz="1800" dirty="0"/>
+              <a:t>://db.foo.com/</a:t>
+            </a:r>
+            <a:r>
+              <a:rPr lang="en-US" sz="1800" dirty="0" err="1"/>
+              <a:t>corp</a:t>
+            </a:r>
+            <a:r>
+              <a:rPr lang="en-US" sz="1800" dirty="0"/>
+              <a:t> --table EMPLOYEES \ --fields-terminated-by '\t' --lines-terminated-by '\</a:t>
+            </a:r>
+            <a:r>
+              <a:rPr lang="en-US" sz="1800" dirty="0" smtClean="0"/>
+              <a:t>n –direct</a:t>
+            </a:r>
+          </a:p>
+          <a:p>
+            <a:pPr marL="0" indent="0">
+              <a:buNone/>
+            </a:pPr>
+            <a:endParaRPr lang="en-US" sz="900" dirty="0" smtClean="0"/>
+          </a:p>
+          <a:p>
+            <a:r>
+              <a:rPr lang="en-US" sz="1800" dirty="0"/>
+              <a:t>$ </a:t>
+            </a:r>
+            <a:r>
+              <a:rPr lang="en-US" sz="1800" dirty="0" err="1"/>
+              <a:t>sqoop</a:t>
+            </a:r>
+            <a:r>
+              <a:rPr lang="en-US" sz="1800" dirty="0"/>
+              <a:t> import --connect </a:t>
+            </a:r>
+            <a:r>
+              <a:rPr lang="en-US" sz="1800" dirty="0" err="1"/>
+              <a:t>jdbc:mysql</a:t>
+            </a:r>
+            <a:r>
+              <a:rPr lang="en-US" sz="1800" dirty="0"/>
+              <a:t>://db.foo.com/</a:t>
+            </a:r>
+            <a:r>
+              <a:rPr lang="en-US" sz="1800" dirty="0" err="1"/>
+              <a:t>corp</a:t>
+            </a:r>
+            <a:r>
+              <a:rPr lang="en-US" sz="1800" dirty="0"/>
+              <a:t> --table EMPLOYEES \ --where "</a:t>
+            </a:r>
+            <a:r>
+              <a:rPr lang="en-US" sz="1800" dirty="0" err="1"/>
+              <a:t>start_date</a:t>
+            </a:r>
+            <a:r>
+              <a:rPr lang="en-US" sz="1800" dirty="0"/>
+              <a:t> &gt; </a:t>
+            </a:r>
+            <a:r>
+              <a:rPr lang="en-US" sz="1800" dirty="0" smtClean="0"/>
+              <a:t>'2013-01-01'“</a:t>
+            </a:r>
+          </a:p>
+          <a:p>
+            <a:pPr marL="0" indent="0">
+              <a:buNone/>
+            </a:pPr>
+            <a:endParaRPr lang="en-US" sz="1000" dirty="0" smtClean="0"/>
+          </a:p>
+          <a:p>
+            <a:r>
+              <a:rPr lang="en-US" sz="1800" dirty="0" err="1"/>
+              <a:t>sqoop</a:t>
+            </a:r>
+            <a:r>
+              <a:rPr lang="en-US" sz="1800" dirty="0"/>
+              <a:t> import --connect </a:t>
+            </a:r>
+            <a:r>
+              <a:rPr lang="en-US" sz="1800" dirty="0" err="1"/>
+              <a:t>jdbc:mysql</a:t>
+            </a:r>
+            <a:r>
+              <a:rPr lang="en-US" sz="1800" dirty="0"/>
+              <a:t>://db.foo.com/</a:t>
+            </a:r>
+            <a:r>
+              <a:rPr lang="en-US" sz="1800" dirty="0" err="1"/>
+              <a:t>corp</a:t>
+            </a:r>
+            <a:r>
+              <a:rPr lang="en-US" sz="1800" dirty="0"/>
+              <a:t> --table EMPLOYEES \ --split-by </a:t>
+            </a:r>
+            <a:r>
+              <a:rPr lang="en-US" sz="1800" dirty="0" err="1" smtClean="0"/>
+              <a:t>dept_id</a:t>
+            </a:r>
+            <a:endParaRPr lang="en-US" sz="1800" dirty="0" smtClean="0"/>
+          </a:p>
+          <a:p>
+            <a:pPr marL="0" indent="0">
+              <a:buNone/>
+            </a:pPr>
+            <a:endParaRPr lang="en-US" sz="900" dirty="0" smtClean="0"/>
+          </a:p>
+          <a:p>
+            <a:r>
+              <a:rPr lang="en-US" sz="1800" dirty="0"/>
+              <a:t>$ </a:t>
+            </a:r>
+            <a:r>
+              <a:rPr lang="en-US" sz="1800" dirty="0" err="1"/>
+              <a:t>sqoop</a:t>
+            </a:r>
+            <a:r>
+              <a:rPr lang="en-US" sz="1800" dirty="0"/>
+              <a:t> import --connect </a:t>
+            </a:r>
+            <a:r>
+              <a:rPr lang="en-US" sz="1800" dirty="0" err="1"/>
+              <a:t>jdbc:mysql</a:t>
+            </a:r>
+            <a:r>
+              <a:rPr lang="en-US" sz="1800" dirty="0"/>
+              <a:t>://db.foo.com/</a:t>
+            </a:r>
+            <a:r>
+              <a:rPr lang="en-US" sz="1800" dirty="0" err="1"/>
+              <a:t>somedb</a:t>
+            </a:r>
+            <a:r>
+              <a:rPr lang="en-US" sz="1800" dirty="0"/>
+              <a:t> --table </a:t>
+            </a:r>
+            <a:r>
+              <a:rPr lang="en-US" sz="1800" dirty="0" err="1"/>
+              <a:t>sometable</a:t>
+            </a:r>
+            <a:r>
+              <a:rPr lang="en-US" sz="1800" dirty="0"/>
+              <a:t> \ --where "id &gt; 100000" --target-</a:t>
+            </a:r>
+            <a:r>
+              <a:rPr lang="en-US" sz="1800" dirty="0" err="1"/>
+              <a:t>dir</a:t>
+            </a:r>
+            <a:r>
+              <a:rPr lang="en-US" sz="1800" dirty="0"/>
+              <a:t> /</a:t>
+            </a:r>
+            <a:r>
+              <a:rPr lang="en-US" sz="1800" dirty="0" err="1"/>
+              <a:t>incremental_dataset</a:t>
+            </a:r>
+            <a:r>
+              <a:rPr lang="en-US" sz="1800" dirty="0"/>
+              <a:t> </a:t>
+            </a:r>
+            <a:r>
+              <a:rPr lang="en-US" sz="1800" dirty="0" smtClean="0"/>
+              <a:t>–append</a:t>
+            </a:r>
+          </a:p>
+          <a:p>
+            <a:pPr marL="0" indent="0">
+              <a:buNone/>
+            </a:pPr>
+            <a:endParaRPr lang="en-US" sz="1000" dirty="0" smtClean="0"/>
+          </a:p>
+          <a:p>
+            <a:r>
+              <a:rPr lang="en-US" sz="1800" dirty="0"/>
+              <a:t>$ </a:t>
+            </a:r>
+            <a:r>
+              <a:rPr lang="en-US" sz="1800" dirty="0" err="1"/>
+              <a:t>sqoop</a:t>
+            </a:r>
+            <a:r>
+              <a:rPr lang="en-US" sz="1800" dirty="0"/>
+              <a:t> import --connect </a:t>
+            </a:r>
+            <a:r>
+              <a:rPr lang="en-US" sz="1800" dirty="0" err="1"/>
+              <a:t>jdbc:mysql</a:t>
+            </a:r>
+            <a:r>
+              <a:rPr lang="en-US" sz="1800" dirty="0"/>
+              <a:t>://db.foo.com/</a:t>
+            </a:r>
+            <a:r>
+              <a:rPr lang="en-US" sz="1800" dirty="0" err="1"/>
+              <a:t>corp</a:t>
+            </a:r>
+            <a:r>
+              <a:rPr lang="en-US" sz="1800" dirty="0"/>
+              <a:t> \ --table EMPLOYEES </a:t>
+            </a:r>
+            <a:r>
+              <a:rPr lang="en-US" sz="1800" dirty="0" smtClean="0"/>
+              <a:t>–validate</a:t>
+            </a:r>
+          </a:p>
+          <a:p>
+            <a:pPr marL="0" indent="0">
+              <a:buNone/>
+            </a:pPr>
+            <a:endParaRPr lang="en-US" sz="900" dirty="0" smtClean="0"/>
+          </a:p>
+          <a:p>
+            <a:r>
+              <a:rPr lang="en-US" sz="1800" dirty="0"/>
+              <a:t>$ </a:t>
+            </a:r>
+            <a:r>
+              <a:rPr lang="en-US" sz="1800" dirty="0" err="1"/>
+              <a:t>sqoop</a:t>
+            </a:r>
+            <a:r>
+              <a:rPr lang="en-US" sz="1800" dirty="0"/>
+              <a:t> merge --new-data newer --onto older --target-</a:t>
+            </a:r>
+            <a:r>
+              <a:rPr lang="en-US" sz="1800" dirty="0" err="1"/>
+              <a:t>dir</a:t>
+            </a:r>
+            <a:r>
+              <a:rPr lang="en-US" sz="1800" dirty="0"/>
+              <a:t> merged \ --jar-file datatypes.jar --class-name Foo --merge-key id</a:t>
+            </a:r>
           </a:p>
         </p:txBody>
       </p:sp>
     </p:spTree>
     <p:extLst>
       <p:ext uri="{BB962C8B-B14F-4D97-AF65-F5344CB8AC3E}">
-        <p14:creationId xmlns:p14="http://schemas.microsoft.com/office/powerpoint/2010/main" val="799851996"/>
+        <p14:creationId xmlns:p14="http://schemas.microsoft.com/office/powerpoint/2010/main" val="2908421342"/>
       </p:ext>
     </p:extLst>
   </p:cSld>
   <p:clrMapOvr>
     <a:masterClrMapping/>
   </p:clrMapOvr>
-  <p:timing>
-    <p:tnLst>
-      <p:par>
-        <p:cTn id="1" dur="indefinite" restart="never" nodeType="tmRoot"/>
-      </p:par>
-    </p:tnLst>
-  </p:timing>
 </p:sld>
 </file>
 
@@ -12577,8 +12945,12 @@
           <a:p>
             <a:pPr algn="ctr"/>
             <a:r>
+              <a:rPr lang="en-US" dirty="0" err="1" smtClean="0"/>
+              <a:t>Sqoop</a:t>
+            </a:r>
+            <a:r>
               <a:rPr lang="en-US" dirty="0" smtClean="0"/>
-              <a:t>Export Parameters</a:t>
+              <a:t> - Export</a:t>
             </a:r>
             <a:endParaRPr lang="en-US" dirty="0"/>
           </a:p>
@@ -12601,93 +12973,87 @@
           <a:p>
             <a:r>
               <a:rPr lang="en-US" dirty="0" smtClean="0"/>
-              <a:t>--direct</a:t>
+              <a:t>Export</a:t>
             </a:r>
           </a:p>
           <a:p>
             <a:pPr lvl="1"/>
             <a:r>
               <a:rPr lang="en-US" dirty="0" smtClean="0"/>
-              <a:t>Used to quickly perform the export for MySQL.</a:t>
-            </a:r>
-          </a:p>
-          <a:p>
+              <a:t>Moves HDFS data back to RDBMS table</a:t>
+            </a:r>
+          </a:p>
+          <a:p>
+            <a:pPr lvl="1"/>
             <a:r>
               <a:rPr lang="en-US" dirty="0" smtClean="0"/>
-              <a:t>--export-</a:t>
+              <a:t>Output table must exist in RDBMS before executing export job!</a:t>
+            </a:r>
+          </a:p>
+          <a:p>
+            <a:pPr lvl="1"/>
+            <a:r>
+              <a:rPr lang="en-US" dirty="0" smtClean="0"/>
+              <a:t>Since import process is done parallel, the output files can be a set of files.</a:t>
+            </a:r>
+          </a:p>
+          <a:p>
+            <a:pPr lvl="1"/>
+            <a:r>
+              <a:rPr lang="en-US" dirty="0" smtClean="0"/>
+              <a:t>Reads delimited output files line-by-line</a:t>
+            </a:r>
+          </a:p>
+          <a:p>
+            <a:pPr lvl="2"/>
+            <a:r>
+              <a:rPr lang="en-US" dirty="0"/>
+              <a:t>Parses data into records</a:t>
+            </a:r>
+            <a:endParaRPr lang="en-US" dirty="0" smtClean="0"/>
+          </a:p>
+          <a:p>
+            <a:pPr lvl="2"/>
+            <a:r>
+              <a:rPr lang="en-US" dirty="0" smtClean="0"/>
+              <a:t>Translates into INSERT</a:t>
+            </a:r>
+          </a:p>
+          <a:p>
+            <a:pPr lvl="2"/>
+            <a:r>
+              <a:rPr lang="en-US" dirty="0" smtClean="0"/>
+              <a:t>Inserts the data into the export table</a:t>
+            </a:r>
+          </a:p>
+          <a:p>
+            <a:pPr lvl="2"/>
+            <a:r>
+              <a:rPr lang="en-US" dirty="0" smtClean="0"/>
+              <a:t>Primary key (if exists) must be unique in the file</a:t>
+            </a:r>
+          </a:p>
+          <a:p>
+            <a:pPr lvl="3"/>
+            <a:r>
+              <a:rPr lang="en-US" dirty="0" smtClean="0"/>
+              <a:t>Primary key constraints</a:t>
+            </a:r>
+          </a:p>
+          <a:p>
+            <a:pPr lvl="1"/>
+            <a:r>
+              <a:rPr lang="en-US" dirty="0" smtClean="0"/>
+              <a:t>Export process runs </a:t>
             </a:r>
             <a:r>
               <a:rPr lang="en-US" dirty="0" err="1" smtClean="0"/>
-              <a:t>dir</a:t>
+              <a:t>MapReduce</a:t>
             </a:r>
             <a:r>
               <a:rPr lang="en-US" dirty="0" smtClean="0"/>
-              <a:t> &lt;directory&gt;</a:t>
-            </a:r>
-          </a:p>
-          <a:p>
-            <a:pPr lvl="1"/>
-            <a:r>
-              <a:rPr lang="en-US" dirty="0" smtClean="0"/>
-              <a:t>HDFS input files location</a:t>
-            </a:r>
-          </a:p>
-          <a:p>
-            <a:r>
-              <a:rPr lang="en-US" dirty="0" smtClean="0"/>
-              <a:t>--table &lt;</a:t>
-            </a:r>
-            <a:r>
-              <a:rPr lang="en-US" dirty="0" err="1" smtClean="0"/>
-              <a:t>tablename</a:t>
-            </a:r>
-            <a:r>
-              <a:rPr lang="en-US" dirty="0" smtClean="0"/>
-              <a:t>&gt;</a:t>
-            </a:r>
-          </a:p>
-          <a:p>
-            <a:pPr lvl="1"/>
-            <a:r>
-              <a:rPr lang="en-US" dirty="0" smtClean="0"/>
-              <a:t>Specifies the output RDBMS table name</a:t>
-            </a:r>
-          </a:p>
-          <a:p>
-            <a:r>
-              <a:rPr lang="en-US" dirty="0" smtClean="0"/>
-              <a:t>--</a:t>
-            </a:r>
-            <a:r>
-              <a:rPr lang="en-US" dirty="0" err="1" smtClean="0"/>
-              <a:t>num</a:t>
-            </a:r>
-            <a:r>
-              <a:rPr lang="en-US" dirty="0" smtClean="0"/>
-              <a:t>-mappers &lt;</a:t>
-            </a:r>
-            <a:r>
-              <a:rPr lang="en-US" dirty="0" err="1" smtClean="0"/>
-              <a:t>num</a:t>
-            </a:r>
-            <a:r>
-              <a:rPr lang="en-US" dirty="0" smtClean="0"/>
-              <a:t>&gt; or -m</a:t>
-            </a:r>
-          </a:p>
-          <a:p>
-            <a:pPr lvl="1"/>
-            <a:r>
-              <a:rPr lang="en-US" dirty="0" smtClean="0"/>
-              <a:t>Number of mapping tasks</a:t>
-            </a:r>
-          </a:p>
-          <a:p>
-            <a:pPr lvl="1"/>
-            <a:endParaRPr lang="en-US" dirty="0" smtClean="0"/>
-          </a:p>
-          <a:p>
-            <a:pPr lvl="1"/>
+              <a:t> job in parallel </a:t>
+            </a:r>
             <a:endParaRPr lang="en-US" dirty="0"/>
           </a:p>
         </p:txBody>
@@ -12695,7 +13061,7 @@
     </p:spTree>
     <p:extLst>
       <p:ext uri="{BB962C8B-B14F-4D97-AF65-F5344CB8AC3E}">
-        <p14:creationId xmlns:p14="http://schemas.microsoft.com/office/powerpoint/2010/main" val="1508461904"/>
+        <p14:creationId xmlns:p14="http://schemas.microsoft.com/office/powerpoint/2010/main" val="799851996"/>
       </p:ext>
     </p:extLst>
   </p:cSld>
@@ -12747,7 +13113,7 @@
             <a:pPr algn="ctr"/>
             <a:r>
               <a:rPr lang="en-US" dirty="0" smtClean="0"/>
-              <a:t>Export Architecture Diagram</a:t>
+              <a:t>Export Parameters</a:t>
             </a:r>
             <a:endParaRPr lang="en-US" dirty="0"/>
           </a:p>
@@ -12768,78 +13134,103 @@
           <a:bodyPr/>
           <a:lstStyle/>
           <a:p>
+            <a:r>
+              <a:rPr lang="en-US" dirty="0" smtClean="0"/>
+              <a:t>--direct</a:t>
+            </a:r>
+          </a:p>
+          <a:p>
+            <a:pPr lvl="1"/>
+            <a:r>
+              <a:rPr lang="en-US" dirty="0" smtClean="0"/>
+              <a:t>Used to quickly perform the export for MySQL.</a:t>
+            </a:r>
+          </a:p>
+          <a:p>
+            <a:r>
+              <a:rPr lang="en-US" dirty="0" smtClean="0"/>
+              <a:t>--export-</a:t>
+            </a:r>
+            <a:r>
+              <a:rPr lang="en-US" dirty="0" err="1" smtClean="0"/>
+              <a:t>dir</a:t>
+            </a:r>
+            <a:r>
+              <a:rPr lang="en-US" dirty="0" smtClean="0"/>
+              <a:t> &lt;directory&gt;</a:t>
+            </a:r>
+          </a:p>
+          <a:p>
+            <a:pPr lvl="1"/>
+            <a:r>
+              <a:rPr lang="en-US" dirty="0" smtClean="0"/>
+              <a:t>HDFS input files location</a:t>
+            </a:r>
+          </a:p>
+          <a:p>
+            <a:r>
+              <a:rPr lang="en-US" dirty="0" smtClean="0"/>
+              <a:t>--table &lt;</a:t>
+            </a:r>
+            <a:r>
+              <a:rPr lang="en-US" dirty="0" err="1" smtClean="0"/>
+              <a:t>tablename</a:t>
+            </a:r>
+            <a:r>
+              <a:rPr lang="en-US" dirty="0" smtClean="0"/>
+              <a:t>&gt;</a:t>
+            </a:r>
+          </a:p>
+          <a:p>
+            <a:pPr lvl="1"/>
+            <a:r>
+              <a:rPr lang="en-US" dirty="0" smtClean="0"/>
+              <a:t>Specifies the output RDBMS table name</a:t>
+            </a:r>
+          </a:p>
+          <a:p>
+            <a:r>
+              <a:rPr lang="en-US" dirty="0" smtClean="0"/>
+              <a:t>--</a:t>
+            </a:r>
+            <a:r>
+              <a:rPr lang="en-US" dirty="0" err="1" smtClean="0"/>
+              <a:t>num</a:t>
+            </a:r>
+            <a:r>
+              <a:rPr lang="en-US" dirty="0" smtClean="0"/>
+              <a:t>-mappers &lt;</a:t>
+            </a:r>
+            <a:r>
+              <a:rPr lang="en-US" dirty="0" err="1" smtClean="0"/>
+              <a:t>num</a:t>
+            </a:r>
+            <a:r>
+              <a:rPr lang="en-US" dirty="0" smtClean="0"/>
+              <a:t>&gt; or -m</a:t>
+            </a:r>
+          </a:p>
+          <a:p>
+            <a:pPr lvl="1"/>
+            <a:r>
+              <a:rPr lang="en-US" dirty="0" smtClean="0"/>
+              <a:t>Number of mapping tasks</a:t>
+            </a:r>
+          </a:p>
+          <a:p>
+            <a:pPr lvl="1"/>
+            <a:endParaRPr lang="en-US" dirty="0" smtClean="0"/>
+          </a:p>
+          <a:p>
+            <a:pPr lvl="1"/>
             <a:endParaRPr lang="en-US" dirty="0"/>
           </a:p>
         </p:txBody>
       </p:sp>
-      <p:pic>
-        <p:nvPicPr>
-          <p:cNvPr id="2050" name="Picture 2"/>
-          <p:cNvPicPr>
-            <a:picLocks noChangeAspect="1" noChangeArrowheads="1"/>
-          </p:cNvPicPr>
-          <p:nvPr/>
-        </p:nvPicPr>
-        <p:blipFill>
-          <a:blip r:embed="rId2">
-            <a:extLst>
-              <a:ext uri="{28A0092B-C50C-407E-A947-70E740481C1C}">
-                <a14:useLocalDpi xmlns:a14="http://schemas.microsoft.com/office/drawing/2010/main" val="0"/>
-              </a:ext>
-            </a:extLst>
-          </a:blip>
-          <a:srcRect/>
-          <a:stretch>
-            <a:fillRect/>
-          </a:stretch>
-        </p:blipFill>
-        <p:spPr bwMode="auto">
-          <a:xfrm>
-            <a:off x="533400" y="1620369"/>
-            <a:ext cx="7950740" cy="4628031"/>
-          </a:xfrm>
-          <a:prstGeom prst="rect">
-            <a:avLst/>
-          </a:prstGeom>
-          <a:noFill/>
-          <a:ln>
-            <a:noFill/>
-          </a:ln>
-          <a:effectLst/>
-          <a:extLst>
-            <a:ext uri="{909E8E84-426E-40DD-AFC4-6F175D3DCCD1}">
-              <a14:hiddenFill xmlns:a14="http://schemas.microsoft.com/office/drawing/2010/main">
-                <a:solidFill>
-                  <a:schemeClr val="accent1"/>
-                </a:solidFill>
-              </a14:hiddenFill>
-            </a:ext>
-            <a:ext uri="{91240B29-F687-4F45-9708-019B960494DF}">
-              <a14:hiddenLine xmlns:a14="http://schemas.microsoft.com/office/drawing/2010/main" w="9525">
-                <a:solidFill>
-                  <a:schemeClr val="tx1"/>
-                </a:solidFill>
-                <a:miter lim="800000"/>
-                <a:headEnd/>
-                <a:tailEnd/>
-              </a14:hiddenLine>
-            </a:ext>
-            <a:ext uri="{AF507438-7753-43E0-B8FC-AC1667EBCBE1}">
-              <a14:hiddenEffects xmlns:a14="http://schemas.microsoft.com/office/drawing/2010/main">
-                <a:effectLst>
-                  <a:outerShdw dist="35921" dir="2700000" algn="ctr" rotWithShape="0">
-                    <a:schemeClr val="bg2"/>
-                  </a:outerShdw>
-                </a:effectLst>
-              </a14:hiddenEffects>
-            </a:ext>
-          </a:extLst>
-        </p:spPr>
-      </p:pic>
     </p:spTree>
     <p:extLst>
       <p:ext uri="{BB962C8B-B14F-4D97-AF65-F5344CB8AC3E}">
-        <p14:creationId xmlns:p14="http://schemas.microsoft.com/office/powerpoint/2010/main" val="1338451944"/>
+        <p14:creationId xmlns:p14="http://schemas.microsoft.com/office/powerpoint/2010/main" val="1508461904"/>
       </p:ext>
     </p:extLst>
   </p:cSld>

</xml_diff>